<commit_message>
Updates for Lesson 3
</commit_message>
<xml_diff>
--- a/slides/Lesson2.pptx
+++ b/slides/Lesson2.pptx
@@ -5,7 +5,7 @@
     <p:sldMasterId id="2147483814" r:id="rId1"/>
   </p:sldMasterIdLst>
   <p:notesMasterIdLst>
-    <p:notesMasterId r:id="rId40"/>
+    <p:notesMasterId r:id="rId30"/>
   </p:notesMasterIdLst>
   <p:sldIdLst>
     <p:sldId id="256" r:id="rId2"/>
@@ -34,18 +34,8 @@
     <p:sldId id="324" r:id="rId25"/>
     <p:sldId id="336" r:id="rId26"/>
     <p:sldId id="326" r:id="rId27"/>
-    <p:sldId id="327" r:id="rId28"/>
-    <p:sldId id="328" r:id="rId29"/>
-    <p:sldId id="334" r:id="rId30"/>
-    <p:sldId id="329" r:id="rId31"/>
-    <p:sldId id="335" r:id="rId32"/>
-    <p:sldId id="339" r:id="rId33"/>
-    <p:sldId id="340" r:id="rId34"/>
-    <p:sldId id="341" r:id="rId35"/>
-    <p:sldId id="342" r:id="rId36"/>
-    <p:sldId id="344" r:id="rId37"/>
-    <p:sldId id="345" r:id="rId38"/>
-    <p:sldId id="262" r:id="rId39"/>
+    <p:sldId id="345" r:id="rId28"/>
+    <p:sldId id="262" r:id="rId29"/>
   </p:sldIdLst>
   <p:sldSz cx="12192000" cy="6858000"/>
   <p:notesSz cx="6858000" cy="9144000"/>
@@ -234,7 +224,7 @@
           <a:p>
             <a:fld id="{B065A488-1AC6-B649-A88A-91D0E808665E}" type="datetimeFigureOut">
               <a:rPr lang="en-US" smtClean="0"/>
-              <a:t>1/20/19</a:t>
+              <a:t>2/5/19</a:t>
             </a:fld>
             <a:endParaRPr lang="en-US" dirty="0"/>
           </a:p>
@@ -502,1186 +492,6 @@
 </p:notesMaster>
 </file>
 
-<file path=ppt/notesSlides/notesSlide1.xml><?xml version="1.0" encoding="utf-8"?>
-<p:notes xmlns:a="http://schemas.openxmlformats.org/drawingml/2006/main" xmlns:r="http://schemas.openxmlformats.org/officeDocument/2006/relationships" xmlns:p="http://schemas.openxmlformats.org/presentationml/2006/main">
-  <p:cSld>
-    <p:spTree>
-      <p:nvGrpSpPr>
-        <p:cNvPr id="1" name=""/>
-        <p:cNvGrpSpPr/>
-        <p:nvPr/>
-      </p:nvGrpSpPr>
-      <p:grpSpPr>
-        <a:xfrm>
-          <a:off x="0" y="0"/>
-          <a:ext cx="0" cy="0"/>
-          <a:chOff x="0" y="0"/>
-          <a:chExt cx="0" cy="0"/>
-        </a:xfrm>
-      </p:grpSpPr>
-      <p:sp>
-        <p:nvSpPr>
-          <p:cNvPr id="57346" name="Rectangle 7"/>
-          <p:cNvSpPr>
-            <a:spLocks noGrp="1" noChangeArrowheads="1"/>
-          </p:cNvSpPr>
-          <p:nvPr>
-            <p:ph type="sldNum" sz="quarter" idx="5"/>
-          </p:nvPr>
-        </p:nvSpPr>
-        <p:spPr>
-          <a:noFill/>
-          <a:ln/>
-          <a:extLst>
-            <a:ext uri="{909E8E84-426E-40DD-AFC4-6F175D3DCCD1}">
-              <a14:hiddenFill xmlns:a14="http://schemas.microsoft.com/office/drawing/2010/main">
-                <a:solidFill>
-                  <a:srgbClr val="FFFFFF"/>
-                </a:solidFill>
-              </a14:hiddenFill>
-            </a:ext>
-            <a:ext uri="{91240B29-F687-4F45-9708-019B960494DF}">
-              <a14:hiddenLine xmlns:a14="http://schemas.microsoft.com/office/drawing/2010/main" w="9525">
-                <a:solidFill>
-                  <a:srgbClr val="000000"/>
-                </a:solidFill>
-                <a:miter lim="800000"/>
-                <a:headEnd/>
-                <a:tailEnd/>
-              </a14:hiddenLine>
-            </a:ext>
-          </a:extLst>
-        </p:spPr>
-        <p:txBody>
-          <a:bodyPr/>
-          <a:lstStyle>
-            <a:lvl1pPr>
-              <a:defRPr>
-                <a:solidFill>
-                  <a:schemeClr val="tx1"/>
-                </a:solidFill>
-                <a:latin typeface="Tahoma" charset="0"/>
-              </a:defRPr>
-            </a:lvl1pPr>
-            <a:lvl2pPr marL="742950" indent="-285750">
-              <a:defRPr>
-                <a:solidFill>
-                  <a:schemeClr val="tx1"/>
-                </a:solidFill>
-                <a:latin typeface="Tahoma" charset="0"/>
-              </a:defRPr>
-            </a:lvl2pPr>
-            <a:lvl3pPr marL="1143000" indent="-228600">
-              <a:defRPr>
-                <a:solidFill>
-                  <a:schemeClr val="tx1"/>
-                </a:solidFill>
-                <a:latin typeface="Tahoma" charset="0"/>
-              </a:defRPr>
-            </a:lvl3pPr>
-            <a:lvl4pPr marL="1600200" indent="-228600">
-              <a:defRPr>
-                <a:solidFill>
-                  <a:schemeClr val="tx1"/>
-                </a:solidFill>
-                <a:latin typeface="Tahoma" charset="0"/>
-              </a:defRPr>
-            </a:lvl4pPr>
-            <a:lvl5pPr marL="2057400" indent="-228600">
-              <a:defRPr>
-                <a:solidFill>
-                  <a:schemeClr val="tx1"/>
-                </a:solidFill>
-                <a:latin typeface="Tahoma" charset="0"/>
-              </a:defRPr>
-            </a:lvl5pPr>
-            <a:lvl6pPr marL="2514600" indent="-228600" eaLnBrk="0" fontAlgn="base" hangingPunct="0">
-              <a:spcBef>
-                <a:spcPct val="0"/>
-              </a:spcBef>
-              <a:spcAft>
-                <a:spcPct val="0"/>
-              </a:spcAft>
-              <a:defRPr>
-                <a:solidFill>
-                  <a:schemeClr val="tx1"/>
-                </a:solidFill>
-                <a:latin typeface="Tahoma" charset="0"/>
-              </a:defRPr>
-            </a:lvl6pPr>
-            <a:lvl7pPr marL="2971800" indent="-228600" eaLnBrk="0" fontAlgn="base" hangingPunct="0">
-              <a:spcBef>
-                <a:spcPct val="0"/>
-              </a:spcBef>
-              <a:spcAft>
-                <a:spcPct val="0"/>
-              </a:spcAft>
-              <a:defRPr>
-                <a:solidFill>
-                  <a:schemeClr val="tx1"/>
-                </a:solidFill>
-                <a:latin typeface="Tahoma" charset="0"/>
-              </a:defRPr>
-            </a:lvl7pPr>
-            <a:lvl8pPr marL="3429000" indent="-228600" eaLnBrk="0" fontAlgn="base" hangingPunct="0">
-              <a:spcBef>
-                <a:spcPct val="0"/>
-              </a:spcBef>
-              <a:spcAft>
-                <a:spcPct val="0"/>
-              </a:spcAft>
-              <a:defRPr>
-                <a:solidFill>
-                  <a:schemeClr val="tx1"/>
-                </a:solidFill>
-                <a:latin typeface="Tahoma" charset="0"/>
-              </a:defRPr>
-            </a:lvl8pPr>
-            <a:lvl9pPr marL="3886200" indent="-228600" eaLnBrk="0" fontAlgn="base" hangingPunct="0">
-              <a:spcBef>
-                <a:spcPct val="0"/>
-              </a:spcBef>
-              <a:spcAft>
-                <a:spcPct val="0"/>
-              </a:spcAft>
-              <a:defRPr>
-                <a:solidFill>
-                  <a:schemeClr val="tx1"/>
-                </a:solidFill>
-                <a:latin typeface="Tahoma" charset="0"/>
-              </a:defRPr>
-            </a:lvl9pPr>
-          </a:lstStyle>
-          <a:p>
-            <a:fld id="{0A6D75D2-0976-924B-BD46-10CA86BCD84B}" type="slidenum">
-              <a:rPr lang="en-US" altLang="x-none">
-                <a:latin typeface="Arial" charset="0"/>
-              </a:rPr>
-              <a:pPr/>
-              <a:t>32</a:t>
-            </a:fld>
-            <a:endParaRPr lang="en-US" altLang="x-none" dirty="0">
-              <a:latin typeface="Arial" charset="0"/>
-            </a:endParaRPr>
-          </a:p>
-        </p:txBody>
-      </p:sp>
-      <p:sp>
-        <p:nvSpPr>
-          <p:cNvPr id="57347" name="Rectangle 2"/>
-          <p:cNvSpPr>
-            <a:spLocks noGrp="1" noRot="1" noChangeAspect="1" noChangeArrowheads="1" noTextEdit="1"/>
-          </p:cNvSpPr>
-          <p:nvPr>
-            <p:ph type="sldImg"/>
-          </p:nvPr>
-        </p:nvSpPr>
-        <p:spPr>
-          <a:ln/>
-        </p:spPr>
-      </p:sp>
-      <p:sp>
-        <p:nvSpPr>
-          <p:cNvPr id="57348" name="Rectangle 3"/>
-          <p:cNvSpPr>
-            <a:spLocks noGrp="1" noChangeArrowheads="1"/>
-          </p:cNvSpPr>
-          <p:nvPr>
-            <p:ph type="body" idx="1"/>
-          </p:nvPr>
-        </p:nvSpPr>
-        <p:spPr>
-          <a:noFill/>
-          <a:ln/>
-          <a:extLst>
-            <a:ext uri="{909E8E84-426E-40DD-AFC4-6F175D3DCCD1}">
-              <a14:hiddenFill xmlns:a14="http://schemas.microsoft.com/office/drawing/2010/main">
-                <a:solidFill>
-                  <a:srgbClr val="FFFFFF"/>
-                </a:solidFill>
-              </a14:hiddenFill>
-            </a:ext>
-            <a:ext uri="{91240B29-F687-4F45-9708-019B960494DF}">
-              <a14:hiddenLine xmlns:a14="http://schemas.microsoft.com/office/drawing/2010/main" w="9525">
-                <a:solidFill>
-                  <a:srgbClr val="000000"/>
-                </a:solidFill>
-                <a:miter lim="800000"/>
-                <a:headEnd/>
-                <a:tailEnd/>
-              </a14:hiddenLine>
-            </a:ext>
-            <a:ext uri="{FAA26D3D-D897-4be2-8F04-BA451C77F1D7}">
-              <ma14:placeholderFlag xmlns:ma14="http://schemas.microsoft.com/office/mac/drawingml/2011/main" val="1"/>
-            </a:ext>
-          </a:extLst>
-        </p:spPr>
-        <p:txBody>
-          <a:bodyPr/>
-          <a:lstStyle/>
-          <a:p>
-            <a:pPr eaLnBrk="1" hangingPunct="1"/>
-            <a:endParaRPr lang="x-none" altLang="x-none"/>
-          </a:p>
-        </p:txBody>
-      </p:sp>
-    </p:spTree>
-    <p:extLst>
-      <p:ext uri="{BB962C8B-B14F-4D97-AF65-F5344CB8AC3E}">
-        <p14:creationId xmlns:p14="http://schemas.microsoft.com/office/powerpoint/2010/main" val="544829825"/>
-      </p:ext>
-    </p:extLst>
-  </p:cSld>
-  <p:clrMapOvr>
-    <a:masterClrMapping/>
-  </p:clrMapOvr>
-</p:notes>
-</file>
-
-<file path=ppt/notesSlides/notesSlide2.xml><?xml version="1.0" encoding="utf-8"?>
-<p:notes xmlns:a="http://schemas.openxmlformats.org/drawingml/2006/main" xmlns:r="http://schemas.openxmlformats.org/officeDocument/2006/relationships" xmlns:p="http://schemas.openxmlformats.org/presentationml/2006/main">
-  <p:cSld>
-    <p:spTree>
-      <p:nvGrpSpPr>
-        <p:cNvPr id="1" name=""/>
-        <p:cNvGrpSpPr/>
-        <p:nvPr/>
-      </p:nvGrpSpPr>
-      <p:grpSpPr>
-        <a:xfrm>
-          <a:off x="0" y="0"/>
-          <a:ext cx="0" cy="0"/>
-          <a:chOff x="0" y="0"/>
-          <a:chExt cx="0" cy="0"/>
-        </a:xfrm>
-      </p:grpSpPr>
-      <p:sp>
-        <p:nvSpPr>
-          <p:cNvPr id="58370" name="Rectangle 7"/>
-          <p:cNvSpPr>
-            <a:spLocks noGrp="1" noChangeArrowheads="1"/>
-          </p:cNvSpPr>
-          <p:nvPr>
-            <p:ph type="sldNum" sz="quarter" idx="5"/>
-          </p:nvPr>
-        </p:nvSpPr>
-        <p:spPr>
-          <a:noFill/>
-          <a:ln/>
-          <a:extLst>
-            <a:ext uri="{909E8E84-426E-40DD-AFC4-6F175D3DCCD1}">
-              <a14:hiddenFill xmlns:a14="http://schemas.microsoft.com/office/drawing/2010/main">
-                <a:solidFill>
-                  <a:srgbClr val="FFFFFF"/>
-                </a:solidFill>
-              </a14:hiddenFill>
-            </a:ext>
-            <a:ext uri="{91240B29-F687-4F45-9708-019B960494DF}">
-              <a14:hiddenLine xmlns:a14="http://schemas.microsoft.com/office/drawing/2010/main" w="9525">
-                <a:solidFill>
-                  <a:srgbClr val="000000"/>
-                </a:solidFill>
-                <a:miter lim="800000"/>
-                <a:headEnd/>
-                <a:tailEnd/>
-              </a14:hiddenLine>
-            </a:ext>
-          </a:extLst>
-        </p:spPr>
-        <p:txBody>
-          <a:bodyPr/>
-          <a:lstStyle>
-            <a:lvl1pPr>
-              <a:defRPr>
-                <a:solidFill>
-                  <a:schemeClr val="tx1"/>
-                </a:solidFill>
-                <a:latin typeface="Tahoma" charset="0"/>
-              </a:defRPr>
-            </a:lvl1pPr>
-            <a:lvl2pPr marL="742950" indent="-285750">
-              <a:defRPr>
-                <a:solidFill>
-                  <a:schemeClr val="tx1"/>
-                </a:solidFill>
-                <a:latin typeface="Tahoma" charset="0"/>
-              </a:defRPr>
-            </a:lvl2pPr>
-            <a:lvl3pPr marL="1143000" indent="-228600">
-              <a:defRPr>
-                <a:solidFill>
-                  <a:schemeClr val="tx1"/>
-                </a:solidFill>
-                <a:latin typeface="Tahoma" charset="0"/>
-              </a:defRPr>
-            </a:lvl3pPr>
-            <a:lvl4pPr marL="1600200" indent="-228600">
-              <a:defRPr>
-                <a:solidFill>
-                  <a:schemeClr val="tx1"/>
-                </a:solidFill>
-                <a:latin typeface="Tahoma" charset="0"/>
-              </a:defRPr>
-            </a:lvl4pPr>
-            <a:lvl5pPr marL="2057400" indent="-228600">
-              <a:defRPr>
-                <a:solidFill>
-                  <a:schemeClr val="tx1"/>
-                </a:solidFill>
-                <a:latin typeface="Tahoma" charset="0"/>
-              </a:defRPr>
-            </a:lvl5pPr>
-            <a:lvl6pPr marL="2514600" indent="-228600" eaLnBrk="0" fontAlgn="base" hangingPunct="0">
-              <a:spcBef>
-                <a:spcPct val="0"/>
-              </a:spcBef>
-              <a:spcAft>
-                <a:spcPct val="0"/>
-              </a:spcAft>
-              <a:defRPr>
-                <a:solidFill>
-                  <a:schemeClr val="tx1"/>
-                </a:solidFill>
-                <a:latin typeface="Tahoma" charset="0"/>
-              </a:defRPr>
-            </a:lvl6pPr>
-            <a:lvl7pPr marL="2971800" indent="-228600" eaLnBrk="0" fontAlgn="base" hangingPunct="0">
-              <a:spcBef>
-                <a:spcPct val="0"/>
-              </a:spcBef>
-              <a:spcAft>
-                <a:spcPct val="0"/>
-              </a:spcAft>
-              <a:defRPr>
-                <a:solidFill>
-                  <a:schemeClr val="tx1"/>
-                </a:solidFill>
-                <a:latin typeface="Tahoma" charset="0"/>
-              </a:defRPr>
-            </a:lvl7pPr>
-            <a:lvl8pPr marL="3429000" indent="-228600" eaLnBrk="0" fontAlgn="base" hangingPunct="0">
-              <a:spcBef>
-                <a:spcPct val="0"/>
-              </a:spcBef>
-              <a:spcAft>
-                <a:spcPct val="0"/>
-              </a:spcAft>
-              <a:defRPr>
-                <a:solidFill>
-                  <a:schemeClr val="tx1"/>
-                </a:solidFill>
-                <a:latin typeface="Tahoma" charset="0"/>
-              </a:defRPr>
-            </a:lvl8pPr>
-            <a:lvl9pPr marL="3886200" indent="-228600" eaLnBrk="0" fontAlgn="base" hangingPunct="0">
-              <a:spcBef>
-                <a:spcPct val="0"/>
-              </a:spcBef>
-              <a:spcAft>
-                <a:spcPct val="0"/>
-              </a:spcAft>
-              <a:defRPr>
-                <a:solidFill>
-                  <a:schemeClr val="tx1"/>
-                </a:solidFill>
-                <a:latin typeface="Tahoma" charset="0"/>
-              </a:defRPr>
-            </a:lvl9pPr>
-          </a:lstStyle>
-          <a:p>
-            <a:fld id="{7FFB0C9E-2CF3-214B-A086-725CECB3FBB7}" type="slidenum">
-              <a:rPr lang="en-US" altLang="x-none">
-                <a:latin typeface="Arial" charset="0"/>
-              </a:rPr>
-              <a:pPr/>
-              <a:t>33</a:t>
-            </a:fld>
-            <a:endParaRPr lang="en-US" altLang="x-none" dirty="0">
-              <a:latin typeface="Arial" charset="0"/>
-            </a:endParaRPr>
-          </a:p>
-        </p:txBody>
-      </p:sp>
-      <p:sp>
-        <p:nvSpPr>
-          <p:cNvPr id="58371" name="Rectangle 2"/>
-          <p:cNvSpPr>
-            <a:spLocks noGrp="1" noRot="1" noChangeAspect="1" noChangeArrowheads="1" noTextEdit="1"/>
-          </p:cNvSpPr>
-          <p:nvPr>
-            <p:ph type="sldImg"/>
-          </p:nvPr>
-        </p:nvSpPr>
-        <p:spPr>
-          <a:ln/>
-        </p:spPr>
-      </p:sp>
-      <p:sp>
-        <p:nvSpPr>
-          <p:cNvPr id="58372" name="Rectangle 3"/>
-          <p:cNvSpPr>
-            <a:spLocks noGrp="1" noChangeArrowheads="1"/>
-          </p:cNvSpPr>
-          <p:nvPr>
-            <p:ph type="body" idx="1"/>
-          </p:nvPr>
-        </p:nvSpPr>
-        <p:spPr>
-          <a:noFill/>
-          <a:ln/>
-          <a:extLst>
-            <a:ext uri="{909E8E84-426E-40DD-AFC4-6F175D3DCCD1}">
-              <a14:hiddenFill xmlns:a14="http://schemas.microsoft.com/office/drawing/2010/main">
-                <a:solidFill>
-                  <a:srgbClr val="FFFFFF"/>
-                </a:solidFill>
-              </a14:hiddenFill>
-            </a:ext>
-            <a:ext uri="{91240B29-F687-4F45-9708-019B960494DF}">
-              <a14:hiddenLine xmlns:a14="http://schemas.microsoft.com/office/drawing/2010/main" w="9525">
-                <a:solidFill>
-                  <a:srgbClr val="000000"/>
-                </a:solidFill>
-                <a:miter lim="800000"/>
-                <a:headEnd/>
-                <a:tailEnd/>
-              </a14:hiddenLine>
-            </a:ext>
-            <a:ext uri="{FAA26D3D-D897-4be2-8F04-BA451C77F1D7}">
-              <ma14:placeholderFlag xmlns:ma14="http://schemas.microsoft.com/office/mac/drawingml/2011/main" val="1"/>
-            </a:ext>
-          </a:extLst>
-        </p:spPr>
-        <p:txBody>
-          <a:bodyPr/>
-          <a:lstStyle/>
-          <a:p>
-            <a:pPr eaLnBrk="1" hangingPunct="1"/>
-            <a:endParaRPr lang="x-none" altLang="x-none"/>
-          </a:p>
-        </p:txBody>
-      </p:sp>
-    </p:spTree>
-    <p:extLst>
-      <p:ext uri="{BB962C8B-B14F-4D97-AF65-F5344CB8AC3E}">
-        <p14:creationId xmlns:p14="http://schemas.microsoft.com/office/powerpoint/2010/main" val="203857055"/>
-      </p:ext>
-    </p:extLst>
-  </p:cSld>
-  <p:clrMapOvr>
-    <a:masterClrMapping/>
-  </p:clrMapOvr>
-</p:notes>
-</file>
-
-<file path=ppt/notesSlides/notesSlide3.xml><?xml version="1.0" encoding="utf-8"?>
-<p:notes xmlns:a="http://schemas.openxmlformats.org/drawingml/2006/main" xmlns:r="http://schemas.openxmlformats.org/officeDocument/2006/relationships" xmlns:p="http://schemas.openxmlformats.org/presentationml/2006/main">
-  <p:cSld>
-    <p:spTree>
-      <p:nvGrpSpPr>
-        <p:cNvPr id="1" name=""/>
-        <p:cNvGrpSpPr/>
-        <p:nvPr/>
-      </p:nvGrpSpPr>
-      <p:grpSpPr>
-        <a:xfrm>
-          <a:off x="0" y="0"/>
-          <a:ext cx="0" cy="0"/>
-          <a:chOff x="0" y="0"/>
-          <a:chExt cx="0" cy="0"/>
-        </a:xfrm>
-      </p:grpSpPr>
-      <p:sp>
-        <p:nvSpPr>
-          <p:cNvPr id="60418" name="Rectangle 7"/>
-          <p:cNvSpPr>
-            <a:spLocks noGrp="1" noChangeArrowheads="1"/>
-          </p:cNvSpPr>
-          <p:nvPr>
-            <p:ph type="sldNum" sz="quarter" idx="5"/>
-          </p:nvPr>
-        </p:nvSpPr>
-        <p:spPr>
-          <a:noFill/>
-          <a:ln/>
-          <a:extLst>
-            <a:ext uri="{909E8E84-426E-40DD-AFC4-6F175D3DCCD1}">
-              <a14:hiddenFill xmlns:a14="http://schemas.microsoft.com/office/drawing/2010/main">
-                <a:solidFill>
-                  <a:srgbClr val="FFFFFF"/>
-                </a:solidFill>
-              </a14:hiddenFill>
-            </a:ext>
-            <a:ext uri="{91240B29-F687-4F45-9708-019B960494DF}">
-              <a14:hiddenLine xmlns:a14="http://schemas.microsoft.com/office/drawing/2010/main" w="9525">
-                <a:solidFill>
-                  <a:srgbClr val="000000"/>
-                </a:solidFill>
-                <a:miter lim="800000"/>
-                <a:headEnd/>
-                <a:tailEnd/>
-              </a14:hiddenLine>
-            </a:ext>
-          </a:extLst>
-        </p:spPr>
-        <p:txBody>
-          <a:bodyPr/>
-          <a:lstStyle>
-            <a:lvl1pPr>
-              <a:defRPr>
-                <a:solidFill>
-                  <a:schemeClr val="tx1"/>
-                </a:solidFill>
-                <a:latin typeface="Tahoma" charset="0"/>
-              </a:defRPr>
-            </a:lvl1pPr>
-            <a:lvl2pPr marL="742950" indent="-285750">
-              <a:defRPr>
-                <a:solidFill>
-                  <a:schemeClr val="tx1"/>
-                </a:solidFill>
-                <a:latin typeface="Tahoma" charset="0"/>
-              </a:defRPr>
-            </a:lvl2pPr>
-            <a:lvl3pPr marL="1143000" indent="-228600">
-              <a:defRPr>
-                <a:solidFill>
-                  <a:schemeClr val="tx1"/>
-                </a:solidFill>
-                <a:latin typeface="Tahoma" charset="0"/>
-              </a:defRPr>
-            </a:lvl3pPr>
-            <a:lvl4pPr marL="1600200" indent="-228600">
-              <a:defRPr>
-                <a:solidFill>
-                  <a:schemeClr val="tx1"/>
-                </a:solidFill>
-                <a:latin typeface="Tahoma" charset="0"/>
-              </a:defRPr>
-            </a:lvl4pPr>
-            <a:lvl5pPr marL="2057400" indent="-228600">
-              <a:defRPr>
-                <a:solidFill>
-                  <a:schemeClr val="tx1"/>
-                </a:solidFill>
-                <a:latin typeface="Tahoma" charset="0"/>
-              </a:defRPr>
-            </a:lvl5pPr>
-            <a:lvl6pPr marL="2514600" indent="-228600" eaLnBrk="0" fontAlgn="base" hangingPunct="0">
-              <a:spcBef>
-                <a:spcPct val="0"/>
-              </a:spcBef>
-              <a:spcAft>
-                <a:spcPct val="0"/>
-              </a:spcAft>
-              <a:defRPr>
-                <a:solidFill>
-                  <a:schemeClr val="tx1"/>
-                </a:solidFill>
-                <a:latin typeface="Tahoma" charset="0"/>
-              </a:defRPr>
-            </a:lvl6pPr>
-            <a:lvl7pPr marL="2971800" indent="-228600" eaLnBrk="0" fontAlgn="base" hangingPunct="0">
-              <a:spcBef>
-                <a:spcPct val="0"/>
-              </a:spcBef>
-              <a:spcAft>
-                <a:spcPct val="0"/>
-              </a:spcAft>
-              <a:defRPr>
-                <a:solidFill>
-                  <a:schemeClr val="tx1"/>
-                </a:solidFill>
-                <a:latin typeface="Tahoma" charset="0"/>
-              </a:defRPr>
-            </a:lvl7pPr>
-            <a:lvl8pPr marL="3429000" indent="-228600" eaLnBrk="0" fontAlgn="base" hangingPunct="0">
-              <a:spcBef>
-                <a:spcPct val="0"/>
-              </a:spcBef>
-              <a:spcAft>
-                <a:spcPct val="0"/>
-              </a:spcAft>
-              <a:defRPr>
-                <a:solidFill>
-                  <a:schemeClr val="tx1"/>
-                </a:solidFill>
-                <a:latin typeface="Tahoma" charset="0"/>
-              </a:defRPr>
-            </a:lvl8pPr>
-            <a:lvl9pPr marL="3886200" indent="-228600" eaLnBrk="0" fontAlgn="base" hangingPunct="0">
-              <a:spcBef>
-                <a:spcPct val="0"/>
-              </a:spcBef>
-              <a:spcAft>
-                <a:spcPct val="0"/>
-              </a:spcAft>
-              <a:defRPr>
-                <a:solidFill>
-                  <a:schemeClr val="tx1"/>
-                </a:solidFill>
-                <a:latin typeface="Tahoma" charset="0"/>
-              </a:defRPr>
-            </a:lvl9pPr>
-          </a:lstStyle>
-          <a:p>
-            <a:fld id="{02F8543D-5E71-AD43-A08C-46B2D0AFCF3A}" type="slidenum">
-              <a:rPr lang="en-US" altLang="x-none">
-                <a:latin typeface="Arial" charset="0"/>
-              </a:rPr>
-              <a:pPr/>
-              <a:t>34</a:t>
-            </a:fld>
-            <a:endParaRPr lang="en-US" altLang="x-none" dirty="0">
-              <a:latin typeface="Arial" charset="0"/>
-            </a:endParaRPr>
-          </a:p>
-        </p:txBody>
-      </p:sp>
-      <p:sp>
-        <p:nvSpPr>
-          <p:cNvPr id="60419" name="Rectangle 2"/>
-          <p:cNvSpPr>
-            <a:spLocks noGrp="1" noRot="1" noChangeAspect="1" noChangeArrowheads="1" noTextEdit="1"/>
-          </p:cNvSpPr>
-          <p:nvPr>
-            <p:ph type="sldImg"/>
-          </p:nvPr>
-        </p:nvSpPr>
-        <p:spPr>
-          <a:ln/>
-        </p:spPr>
-      </p:sp>
-      <p:sp>
-        <p:nvSpPr>
-          <p:cNvPr id="60420" name="Rectangle 3"/>
-          <p:cNvSpPr>
-            <a:spLocks noGrp="1" noChangeArrowheads="1"/>
-          </p:cNvSpPr>
-          <p:nvPr>
-            <p:ph type="body" idx="1"/>
-          </p:nvPr>
-        </p:nvSpPr>
-        <p:spPr>
-          <a:noFill/>
-          <a:ln/>
-          <a:extLst>
-            <a:ext uri="{909E8E84-426E-40DD-AFC4-6F175D3DCCD1}">
-              <a14:hiddenFill xmlns:a14="http://schemas.microsoft.com/office/drawing/2010/main">
-                <a:solidFill>
-                  <a:srgbClr val="FFFFFF"/>
-                </a:solidFill>
-              </a14:hiddenFill>
-            </a:ext>
-            <a:ext uri="{91240B29-F687-4F45-9708-019B960494DF}">
-              <a14:hiddenLine xmlns:a14="http://schemas.microsoft.com/office/drawing/2010/main" w="9525">
-                <a:solidFill>
-                  <a:srgbClr val="000000"/>
-                </a:solidFill>
-                <a:miter lim="800000"/>
-                <a:headEnd/>
-                <a:tailEnd/>
-              </a14:hiddenLine>
-            </a:ext>
-            <a:ext uri="{FAA26D3D-D897-4be2-8F04-BA451C77F1D7}">
-              <ma14:placeholderFlag xmlns:ma14="http://schemas.microsoft.com/office/mac/drawingml/2011/main" val="1"/>
-            </a:ext>
-          </a:extLst>
-        </p:spPr>
-        <p:txBody>
-          <a:bodyPr/>
-          <a:lstStyle/>
-          <a:p>
-            <a:pPr eaLnBrk="1" hangingPunct="1"/>
-            <a:endParaRPr lang="x-none" altLang="x-none"/>
-          </a:p>
-        </p:txBody>
-      </p:sp>
-    </p:spTree>
-    <p:extLst>
-      <p:ext uri="{BB962C8B-B14F-4D97-AF65-F5344CB8AC3E}">
-        <p14:creationId xmlns:p14="http://schemas.microsoft.com/office/powerpoint/2010/main" val="240689513"/>
-      </p:ext>
-    </p:extLst>
-  </p:cSld>
-  <p:clrMapOvr>
-    <a:masterClrMapping/>
-  </p:clrMapOvr>
-</p:notes>
-</file>
-
-<file path=ppt/notesSlides/notesSlide4.xml><?xml version="1.0" encoding="utf-8"?>
-<p:notes xmlns:a="http://schemas.openxmlformats.org/drawingml/2006/main" xmlns:r="http://schemas.openxmlformats.org/officeDocument/2006/relationships" xmlns:p="http://schemas.openxmlformats.org/presentationml/2006/main">
-  <p:cSld>
-    <p:spTree>
-      <p:nvGrpSpPr>
-        <p:cNvPr id="1" name=""/>
-        <p:cNvGrpSpPr/>
-        <p:nvPr/>
-      </p:nvGrpSpPr>
-      <p:grpSpPr>
-        <a:xfrm>
-          <a:off x="0" y="0"/>
-          <a:ext cx="0" cy="0"/>
-          <a:chOff x="0" y="0"/>
-          <a:chExt cx="0" cy="0"/>
-        </a:xfrm>
-      </p:grpSpPr>
-      <p:sp>
-        <p:nvSpPr>
-          <p:cNvPr id="62466" name="Rectangle 7"/>
-          <p:cNvSpPr>
-            <a:spLocks noGrp="1" noChangeArrowheads="1"/>
-          </p:cNvSpPr>
-          <p:nvPr>
-            <p:ph type="sldNum" sz="quarter" idx="5"/>
-          </p:nvPr>
-        </p:nvSpPr>
-        <p:spPr>
-          <a:noFill/>
-          <a:ln/>
-          <a:extLst>
-            <a:ext uri="{909E8E84-426E-40DD-AFC4-6F175D3DCCD1}">
-              <a14:hiddenFill xmlns:a14="http://schemas.microsoft.com/office/drawing/2010/main">
-                <a:solidFill>
-                  <a:srgbClr val="FFFFFF"/>
-                </a:solidFill>
-              </a14:hiddenFill>
-            </a:ext>
-            <a:ext uri="{91240B29-F687-4F45-9708-019B960494DF}">
-              <a14:hiddenLine xmlns:a14="http://schemas.microsoft.com/office/drawing/2010/main" w="9525">
-                <a:solidFill>
-                  <a:srgbClr val="000000"/>
-                </a:solidFill>
-                <a:miter lim="800000"/>
-                <a:headEnd/>
-                <a:tailEnd/>
-              </a14:hiddenLine>
-            </a:ext>
-          </a:extLst>
-        </p:spPr>
-        <p:txBody>
-          <a:bodyPr/>
-          <a:lstStyle>
-            <a:lvl1pPr>
-              <a:defRPr>
-                <a:solidFill>
-                  <a:schemeClr val="tx1"/>
-                </a:solidFill>
-                <a:latin typeface="Tahoma" charset="0"/>
-              </a:defRPr>
-            </a:lvl1pPr>
-            <a:lvl2pPr marL="742950" indent="-285750">
-              <a:defRPr>
-                <a:solidFill>
-                  <a:schemeClr val="tx1"/>
-                </a:solidFill>
-                <a:latin typeface="Tahoma" charset="0"/>
-              </a:defRPr>
-            </a:lvl2pPr>
-            <a:lvl3pPr marL="1143000" indent="-228600">
-              <a:defRPr>
-                <a:solidFill>
-                  <a:schemeClr val="tx1"/>
-                </a:solidFill>
-                <a:latin typeface="Tahoma" charset="0"/>
-              </a:defRPr>
-            </a:lvl3pPr>
-            <a:lvl4pPr marL="1600200" indent="-228600">
-              <a:defRPr>
-                <a:solidFill>
-                  <a:schemeClr val="tx1"/>
-                </a:solidFill>
-                <a:latin typeface="Tahoma" charset="0"/>
-              </a:defRPr>
-            </a:lvl4pPr>
-            <a:lvl5pPr marL="2057400" indent="-228600">
-              <a:defRPr>
-                <a:solidFill>
-                  <a:schemeClr val="tx1"/>
-                </a:solidFill>
-                <a:latin typeface="Tahoma" charset="0"/>
-              </a:defRPr>
-            </a:lvl5pPr>
-            <a:lvl6pPr marL="2514600" indent="-228600" eaLnBrk="0" fontAlgn="base" hangingPunct="0">
-              <a:spcBef>
-                <a:spcPct val="0"/>
-              </a:spcBef>
-              <a:spcAft>
-                <a:spcPct val="0"/>
-              </a:spcAft>
-              <a:defRPr>
-                <a:solidFill>
-                  <a:schemeClr val="tx1"/>
-                </a:solidFill>
-                <a:latin typeface="Tahoma" charset="0"/>
-              </a:defRPr>
-            </a:lvl6pPr>
-            <a:lvl7pPr marL="2971800" indent="-228600" eaLnBrk="0" fontAlgn="base" hangingPunct="0">
-              <a:spcBef>
-                <a:spcPct val="0"/>
-              </a:spcBef>
-              <a:spcAft>
-                <a:spcPct val="0"/>
-              </a:spcAft>
-              <a:defRPr>
-                <a:solidFill>
-                  <a:schemeClr val="tx1"/>
-                </a:solidFill>
-                <a:latin typeface="Tahoma" charset="0"/>
-              </a:defRPr>
-            </a:lvl7pPr>
-            <a:lvl8pPr marL="3429000" indent="-228600" eaLnBrk="0" fontAlgn="base" hangingPunct="0">
-              <a:spcBef>
-                <a:spcPct val="0"/>
-              </a:spcBef>
-              <a:spcAft>
-                <a:spcPct val="0"/>
-              </a:spcAft>
-              <a:defRPr>
-                <a:solidFill>
-                  <a:schemeClr val="tx1"/>
-                </a:solidFill>
-                <a:latin typeface="Tahoma" charset="0"/>
-              </a:defRPr>
-            </a:lvl8pPr>
-            <a:lvl9pPr marL="3886200" indent="-228600" eaLnBrk="0" fontAlgn="base" hangingPunct="0">
-              <a:spcBef>
-                <a:spcPct val="0"/>
-              </a:spcBef>
-              <a:spcAft>
-                <a:spcPct val="0"/>
-              </a:spcAft>
-              <a:defRPr>
-                <a:solidFill>
-                  <a:schemeClr val="tx1"/>
-                </a:solidFill>
-                <a:latin typeface="Tahoma" charset="0"/>
-              </a:defRPr>
-            </a:lvl9pPr>
-          </a:lstStyle>
-          <a:p>
-            <a:fld id="{4D3F12FB-9EC9-6144-899F-9EC29BA58882}" type="slidenum">
-              <a:rPr lang="en-US" altLang="x-none">
-                <a:latin typeface="Arial" charset="0"/>
-              </a:rPr>
-              <a:pPr/>
-              <a:t>35</a:t>
-            </a:fld>
-            <a:endParaRPr lang="en-US" altLang="x-none" dirty="0">
-              <a:latin typeface="Arial" charset="0"/>
-            </a:endParaRPr>
-          </a:p>
-        </p:txBody>
-      </p:sp>
-      <p:sp>
-        <p:nvSpPr>
-          <p:cNvPr id="62467" name="Rectangle 2"/>
-          <p:cNvSpPr>
-            <a:spLocks noGrp="1" noRot="1" noChangeAspect="1" noChangeArrowheads="1" noTextEdit="1"/>
-          </p:cNvSpPr>
-          <p:nvPr>
-            <p:ph type="sldImg"/>
-          </p:nvPr>
-        </p:nvSpPr>
-        <p:spPr>
-          <a:ln/>
-        </p:spPr>
-      </p:sp>
-      <p:sp>
-        <p:nvSpPr>
-          <p:cNvPr id="62468" name="Rectangle 3"/>
-          <p:cNvSpPr>
-            <a:spLocks noGrp="1" noChangeArrowheads="1"/>
-          </p:cNvSpPr>
-          <p:nvPr>
-            <p:ph type="body" idx="1"/>
-          </p:nvPr>
-        </p:nvSpPr>
-        <p:spPr>
-          <a:noFill/>
-          <a:ln/>
-          <a:extLst>
-            <a:ext uri="{909E8E84-426E-40DD-AFC4-6F175D3DCCD1}">
-              <a14:hiddenFill xmlns:a14="http://schemas.microsoft.com/office/drawing/2010/main">
-                <a:solidFill>
-                  <a:srgbClr val="FFFFFF"/>
-                </a:solidFill>
-              </a14:hiddenFill>
-            </a:ext>
-            <a:ext uri="{91240B29-F687-4F45-9708-019B960494DF}">
-              <a14:hiddenLine xmlns:a14="http://schemas.microsoft.com/office/drawing/2010/main" w="9525">
-                <a:solidFill>
-                  <a:srgbClr val="000000"/>
-                </a:solidFill>
-                <a:miter lim="800000"/>
-                <a:headEnd/>
-                <a:tailEnd/>
-              </a14:hiddenLine>
-            </a:ext>
-            <a:ext uri="{FAA26D3D-D897-4be2-8F04-BA451C77F1D7}">
-              <ma14:placeholderFlag xmlns:ma14="http://schemas.microsoft.com/office/mac/drawingml/2011/main" val="1"/>
-            </a:ext>
-          </a:extLst>
-        </p:spPr>
-        <p:txBody>
-          <a:bodyPr/>
-          <a:lstStyle/>
-          <a:p>
-            <a:pPr eaLnBrk="1" hangingPunct="1"/>
-            <a:endParaRPr lang="x-none" altLang="x-none"/>
-          </a:p>
-        </p:txBody>
-      </p:sp>
-    </p:spTree>
-    <p:extLst>
-      <p:ext uri="{BB962C8B-B14F-4D97-AF65-F5344CB8AC3E}">
-        <p14:creationId xmlns:p14="http://schemas.microsoft.com/office/powerpoint/2010/main" val="363517135"/>
-      </p:ext>
-    </p:extLst>
-  </p:cSld>
-  <p:clrMapOvr>
-    <a:masterClrMapping/>
-  </p:clrMapOvr>
-</p:notes>
-</file>
-
-<file path=ppt/notesSlides/notesSlide5.xml><?xml version="1.0" encoding="utf-8"?>
-<p:notes xmlns:a="http://schemas.openxmlformats.org/drawingml/2006/main" xmlns:r="http://schemas.openxmlformats.org/officeDocument/2006/relationships" xmlns:p="http://schemas.openxmlformats.org/presentationml/2006/main">
-  <p:cSld>
-    <p:spTree>
-      <p:nvGrpSpPr>
-        <p:cNvPr id="1" name=""/>
-        <p:cNvGrpSpPr/>
-        <p:nvPr/>
-      </p:nvGrpSpPr>
-      <p:grpSpPr>
-        <a:xfrm>
-          <a:off x="0" y="0"/>
-          <a:ext cx="0" cy="0"/>
-          <a:chOff x="0" y="0"/>
-          <a:chExt cx="0" cy="0"/>
-        </a:xfrm>
-      </p:grpSpPr>
-      <p:sp>
-        <p:nvSpPr>
-          <p:cNvPr id="68610" name="Rectangle 7"/>
-          <p:cNvSpPr>
-            <a:spLocks noGrp="1" noChangeArrowheads="1"/>
-          </p:cNvSpPr>
-          <p:nvPr>
-            <p:ph type="sldNum" sz="quarter" idx="5"/>
-          </p:nvPr>
-        </p:nvSpPr>
-        <p:spPr>
-          <a:noFill/>
-          <a:ln/>
-          <a:extLst>
-            <a:ext uri="{909E8E84-426E-40DD-AFC4-6F175D3DCCD1}">
-              <a14:hiddenFill xmlns:a14="http://schemas.microsoft.com/office/drawing/2010/main">
-                <a:solidFill>
-                  <a:srgbClr val="FFFFFF"/>
-                </a:solidFill>
-              </a14:hiddenFill>
-            </a:ext>
-            <a:ext uri="{91240B29-F687-4F45-9708-019B960494DF}">
-              <a14:hiddenLine xmlns:a14="http://schemas.microsoft.com/office/drawing/2010/main" w="9525">
-                <a:solidFill>
-                  <a:srgbClr val="000000"/>
-                </a:solidFill>
-                <a:miter lim="800000"/>
-                <a:headEnd/>
-                <a:tailEnd/>
-              </a14:hiddenLine>
-            </a:ext>
-          </a:extLst>
-        </p:spPr>
-        <p:txBody>
-          <a:bodyPr/>
-          <a:lstStyle>
-            <a:lvl1pPr>
-              <a:defRPr>
-                <a:solidFill>
-                  <a:schemeClr val="tx1"/>
-                </a:solidFill>
-                <a:latin typeface="Tahoma" charset="0"/>
-              </a:defRPr>
-            </a:lvl1pPr>
-            <a:lvl2pPr marL="742950" indent="-285750">
-              <a:defRPr>
-                <a:solidFill>
-                  <a:schemeClr val="tx1"/>
-                </a:solidFill>
-                <a:latin typeface="Tahoma" charset="0"/>
-              </a:defRPr>
-            </a:lvl2pPr>
-            <a:lvl3pPr marL="1143000" indent="-228600">
-              <a:defRPr>
-                <a:solidFill>
-                  <a:schemeClr val="tx1"/>
-                </a:solidFill>
-                <a:latin typeface="Tahoma" charset="0"/>
-              </a:defRPr>
-            </a:lvl3pPr>
-            <a:lvl4pPr marL="1600200" indent="-228600">
-              <a:defRPr>
-                <a:solidFill>
-                  <a:schemeClr val="tx1"/>
-                </a:solidFill>
-                <a:latin typeface="Tahoma" charset="0"/>
-              </a:defRPr>
-            </a:lvl4pPr>
-            <a:lvl5pPr marL="2057400" indent="-228600">
-              <a:defRPr>
-                <a:solidFill>
-                  <a:schemeClr val="tx1"/>
-                </a:solidFill>
-                <a:latin typeface="Tahoma" charset="0"/>
-              </a:defRPr>
-            </a:lvl5pPr>
-            <a:lvl6pPr marL="2514600" indent="-228600" eaLnBrk="0" fontAlgn="base" hangingPunct="0">
-              <a:spcBef>
-                <a:spcPct val="0"/>
-              </a:spcBef>
-              <a:spcAft>
-                <a:spcPct val="0"/>
-              </a:spcAft>
-              <a:defRPr>
-                <a:solidFill>
-                  <a:schemeClr val="tx1"/>
-                </a:solidFill>
-                <a:latin typeface="Tahoma" charset="0"/>
-              </a:defRPr>
-            </a:lvl6pPr>
-            <a:lvl7pPr marL="2971800" indent="-228600" eaLnBrk="0" fontAlgn="base" hangingPunct="0">
-              <a:spcBef>
-                <a:spcPct val="0"/>
-              </a:spcBef>
-              <a:spcAft>
-                <a:spcPct val="0"/>
-              </a:spcAft>
-              <a:defRPr>
-                <a:solidFill>
-                  <a:schemeClr val="tx1"/>
-                </a:solidFill>
-                <a:latin typeface="Tahoma" charset="0"/>
-              </a:defRPr>
-            </a:lvl7pPr>
-            <a:lvl8pPr marL="3429000" indent="-228600" eaLnBrk="0" fontAlgn="base" hangingPunct="0">
-              <a:spcBef>
-                <a:spcPct val="0"/>
-              </a:spcBef>
-              <a:spcAft>
-                <a:spcPct val="0"/>
-              </a:spcAft>
-              <a:defRPr>
-                <a:solidFill>
-                  <a:schemeClr val="tx1"/>
-                </a:solidFill>
-                <a:latin typeface="Tahoma" charset="0"/>
-              </a:defRPr>
-            </a:lvl8pPr>
-            <a:lvl9pPr marL="3886200" indent="-228600" eaLnBrk="0" fontAlgn="base" hangingPunct="0">
-              <a:spcBef>
-                <a:spcPct val="0"/>
-              </a:spcBef>
-              <a:spcAft>
-                <a:spcPct val="0"/>
-              </a:spcAft>
-              <a:defRPr>
-                <a:solidFill>
-                  <a:schemeClr val="tx1"/>
-                </a:solidFill>
-                <a:latin typeface="Tahoma" charset="0"/>
-              </a:defRPr>
-            </a:lvl9pPr>
-          </a:lstStyle>
-          <a:p>
-            <a:fld id="{8FEA22F8-3311-DC41-B41B-50C6371255AF}" type="slidenum">
-              <a:rPr lang="en-US" altLang="x-none">
-                <a:latin typeface="Arial" charset="0"/>
-              </a:rPr>
-              <a:pPr/>
-              <a:t>36</a:t>
-            </a:fld>
-            <a:endParaRPr lang="en-US" altLang="x-none" dirty="0">
-              <a:latin typeface="Arial" charset="0"/>
-            </a:endParaRPr>
-          </a:p>
-        </p:txBody>
-      </p:sp>
-      <p:sp>
-        <p:nvSpPr>
-          <p:cNvPr id="68611" name="Rectangle 2"/>
-          <p:cNvSpPr>
-            <a:spLocks noGrp="1" noRot="1" noChangeAspect="1" noChangeArrowheads="1" noTextEdit="1"/>
-          </p:cNvSpPr>
-          <p:nvPr>
-            <p:ph type="sldImg"/>
-          </p:nvPr>
-        </p:nvSpPr>
-        <p:spPr>
-          <a:ln/>
-        </p:spPr>
-      </p:sp>
-      <p:sp>
-        <p:nvSpPr>
-          <p:cNvPr id="68612" name="Rectangle 3"/>
-          <p:cNvSpPr>
-            <a:spLocks noGrp="1" noChangeArrowheads="1"/>
-          </p:cNvSpPr>
-          <p:nvPr>
-            <p:ph type="body" idx="1"/>
-          </p:nvPr>
-        </p:nvSpPr>
-        <p:spPr>
-          <a:noFill/>
-          <a:ln/>
-          <a:extLst>
-            <a:ext uri="{909E8E84-426E-40DD-AFC4-6F175D3DCCD1}">
-              <a14:hiddenFill xmlns:a14="http://schemas.microsoft.com/office/drawing/2010/main">
-                <a:solidFill>
-                  <a:srgbClr val="FFFFFF"/>
-                </a:solidFill>
-              </a14:hiddenFill>
-            </a:ext>
-            <a:ext uri="{91240B29-F687-4F45-9708-019B960494DF}">
-              <a14:hiddenLine xmlns:a14="http://schemas.microsoft.com/office/drawing/2010/main" w="9525">
-                <a:solidFill>
-                  <a:srgbClr val="000000"/>
-                </a:solidFill>
-                <a:miter lim="800000"/>
-                <a:headEnd/>
-                <a:tailEnd/>
-              </a14:hiddenLine>
-            </a:ext>
-            <a:ext uri="{FAA26D3D-D897-4be2-8F04-BA451C77F1D7}">
-              <ma14:placeholderFlag xmlns:ma14="http://schemas.microsoft.com/office/mac/drawingml/2011/main" val="1"/>
-            </a:ext>
-          </a:extLst>
-        </p:spPr>
-        <p:txBody>
-          <a:bodyPr/>
-          <a:lstStyle/>
-          <a:p>
-            <a:pPr eaLnBrk="1" hangingPunct="1"/>
-            <a:endParaRPr lang="x-none" altLang="x-none"/>
-          </a:p>
-        </p:txBody>
-      </p:sp>
-    </p:spTree>
-    <p:extLst>
-      <p:ext uri="{BB962C8B-B14F-4D97-AF65-F5344CB8AC3E}">
-        <p14:creationId xmlns:p14="http://schemas.microsoft.com/office/powerpoint/2010/main" val="1984670723"/>
-      </p:ext>
-    </p:extLst>
-  </p:cSld>
-  <p:clrMapOvr>
-    <a:masterClrMapping/>
-  </p:clrMapOvr>
-</p:notes>
-</file>
-
 <file path=ppt/slideLayouts/slideLayout1.xml><?xml version="1.0" encoding="utf-8"?>
 <p:sldLayout xmlns:a="http://schemas.openxmlformats.org/drawingml/2006/main" xmlns:r="http://schemas.openxmlformats.org/officeDocument/2006/relationships" xmlns:p="http://schemas.openxmlformats.org/presentationml/2006/main" type="title" preserve="1">
   <p:cSld name="Title Slide">
@@ -1909,7 +719,7 @@
           <a:p>
             <a:fld id="{48A87A34-81AB-432B-8DAE-1953F412C126}" type="datetimeFigureOut">
               <a:rPr lang="en-US" smtClean="0"/>
-              <a:t>1/20/19</a:t>
+              <a:t>2/5/19</a:t>
             </a:fld>
             <a:endParaRPr lang="en-US" dirty="0"/>
           </a:p>
@@ -2167,7 +977,7 @@
           <a:p>
             <a:fld id="{48A87A34-81AB-432B-8DAE-1953F412C126}" type="datetimeFigureOut">
               <a:rPr lang="en-US" smtClean="0"/>
-              <a:t>1/20/19</a:t>
+              <a:t>2/5/19</a:t>
             </a:fld>
             <a:endParaRPr lang="en-US" dirty="0"/>
           </a:p>
@@ -2333,7 +1143,7 @@
           <a:p>
             <a:fld id="{48A87A34-81AB-432B-8DAE-1953F412C126}" type="datetimeFigureOut">
               <a:rPr lang="en-US" smtClean="0"/>
-              <a:t>1/20/19</a:t>
+              <a:t>2/5/19</a:t>
             </a:fld>
             <a:endParaRPr lang="en-US" dirty="0"/>
           </a:p>
@@ -2510,7 +1320,7 @@
             <a:fld id="{48A87A34-81AB-432B-8DAE-1953F412C126}" type="datetimeFigureOut">
               <a:rPr lang="en-US" smtClean="0"/>
               <a:pPr/>
-              <a:t>1/20/19</a:t>
+              <a:t>2/5/19</a:t>
             </a:fld>
             <a:endParaRPr lang="en-US" dirty="0"/>
           </a:p>
@@ -2764,7 +1574,7 @@
             <a:fld id="{48A87A34-81AB-432B-8DAE-1953F412C126}" type="datetimeFigureOut">
               <a:rPr lang="en-US" smtClean="0"/>
               <a:pPr/>
-              <a:t>1/20/19</a:t>
+              <a:t>2/5/19</a:t>
             </a:fld>
             <a:endParaRPr lang="en-US" dirty="0"/>
           </a:p>
@@ -3130,7 +1940,7 @@
           <a:p>
             <a:fld id="{48A87A34-81AB-432B-8DAE-1953F412C126}" type="datetimeFigureOut">
               <a:rPr lang="en-US" smtClean="0"/>
-              <a:t>1/20/19</a:t>
+              <a:t>2/5/19</a:t>
             </a:fld>
             <a:endParaRPr lang="en-US" dirty="0"/>
           </a:p>
@@ -3374,7 +2184,7 @@
             <a:fld id="{48A87A34-81AB-432B-8DAE-1953F412C126}" type="datetimeFigureOut">
               <a:rPr lang="en-US" smtClean="0"/>
               <a:pPr/>
-              <a:t>1/20/19</a:t>
+              <a:t>2/5/19</a:t>
             </a:fld>
             <a:endParaRPr lang="en-US" dirty="0"/>
           </a:p>
@@ -3618,7 +2428,7 @@
             <a:fld id="{48A87A34-81AB-432B-8DAE-1953F412C126}" type="datetimeFigureOut">
               <a:rPr lang="en-US" smtClean="0"/>
               <a:pPr/>
-              <a:t>1/20/19</a:t>
+              <a:t>2/5/19</a:t>
             </a:fld>
             <a:endParaRPr lang="en-US" dirty="0"/>
           </a:p>
@@ -3902,7 +2712,7 @@
           <a:p>
             <a:fld id="{48A87A34-81AB-432B-8DAE-1953F412C126}" type="datetimeFigureOut">
               <a:rPr lang="en-US" smtClean="0"/>
-              <a:t>1/20/19</a:t>
+              <a:t>2/5/19</a:t>
             </a:fld>
             <a:endParaRPr lang="en-US" dirty="0"/>
           </a:p>
@@ -4386,7 +3196,7 @@
           <a:p>
             <a:fld id="{48A87A34-81AB-432B-8DAE-1953F412C126}" type="datetimeFigureOut">
               <a:rPr lang="en-US" smtClean="0"/>
-              <a:t>1/20/19</a:t>
+              <a:t>2/5/19</a:t>
             </a:fld>
             <a:endParaRPr lang="en-US" dirty="0"/>
           </a:p>
@@ -4522,7 +3332,7 @@
           <a:p>
             <a:fld id="{48A87A34-81AB-432B-8DAE-1953F412C126}" type="datetimeFigureOut">
               <a:rPr lang="en-US" smtClean="0"/>
-              <a:t>1/20/19</a:t>
+              <a:t>2/5/19</a:t>
             </a:fld>
             <a:endParaRPr lang="en-US" dirty="0"/>
           </a:p>
@@ -4613,7 +3423,7 @@
           <a:p>
             <a:fld id="{48A87A34-81AB-432B-8DAE-1953F412C126}" type="datetimeFigureOut">
               <a:rPr lang="en-US" smtClean="0"/>
-              <a:t>1/20/19</a:t>
+              <a:t>2/5/19</a:t>
             </a:fld>
             <a:endParaRPr lang="en-US" dirty="0"/>
           </a:p>
@@ -4891,7 +3701,7 @@
           <a:p>
             <a:fld id="{48A87A34-81AB-432B-8DAE-1953F412C126}" type="datetimeFigureOut">
               <a:rPr lang="en-US" smtClean="0"/>
-              <a:t>1/20/19</a:t>
+              <a:t>2/5/19</a:t>
             </a:fld>
             <a:endParaRPr lang="en-US" dirty="0"/>
           </a:p>
@@ -5115,7 +3925,7 @@
             <a:fld id="{48A87A34-81AB-432B-8DAE-1953F412C126}" type="datetimeFigureOut">
               <a:rPr lang="en-US" smtClean="0"/>
               <a:pPr/>
-              <a:t>1/20/19</a:t>
+              <a:t>2/5/19</a:t>
             </a:fld>
             <a:endParaRPr lang="en-US" dirty="0"/>
           </a:p>
@@ -5559,15 +4369,7 @@
           <a:p>
             <a:r>
               <a:rPr lang="en-US" dirty="0" smtClean="0"/>
-              <a:t>Lesson </a:t>
-            </a:r>
-            <a:r>
-              <a:rPr lang="en-US" dirty="0" smtClean="0"/>
-              <a:t>2: 23 </a:t>
-            </a:r>
-            <a:r>
-              <a:rPr lang="en-US" dirty="0" smtClean="0"/>
-              <a:t>January 2019</a:t>
+              <a:t>Lesson 2: 23 January 2019</a:t>
             </a:r>
             <a:endParaRPr lang="en-US" dirty="0"/>
           </a:p>
@@ -7896,26 +6698,13 @@
           <a:p>
             <a:r>
               <a:rPr lang="en-US" dirty="0" smtClean="0"/>
-              <a:t>Python is a scripting language that is eas</a:t>
-            </a:r>
-            <a:r>
-              <a:rPr lang="en-US" dirty="0" smtClean="0"/>
-              <a:t>y to learn.</a:t>
-            </a:r>
-            <a:endParaRPr lang="en-US" dirty="0" smtClean="0"/>
-          </a:p>
-          <a:p>
-            <a:r>
-              <a:rPr lang="en-US" dirty="0" smtClean="0"/>
-              <a:t>Use </a:t>
-            </a:r>
-            <a:r>
-              <a:rPr lang="en-US" dirty="0" smtClean="0"/>
-              <a:t>Python to program </a:t>
-            </a:r>
-            <a:r>
-              <a:rPr lang="en-US" dirty="0" smtClean="0"/>
-              <a:t>Minecraft!</a:t>
+              <a:t>Python is a scripting language that is easy to learn.</a:t>
+            </a:r>
+          </a:p>
+          <a:p>
+            <a:r>
+              <a:rPr lang="en-US" dirty="0" smtClean="0"/>
+              <a:t>Use Python to program Minecraft!</a:t>
             </a:r>
             <a:endParaRPr lang="en-US" dirty="0"/>
           </a:p>
@@ -8097,14 +6886,27 @@
             <a:pPr lvl="1"/>
             <a:r>
               <a:rPr lang="en-US" dirty="0" smtClean="0"/>
-              <a:t>Introduction to Python Programming</a:t>
-            </a:r>
+              <a:t>Introduction to </a:t>
+            </a:r>
+            <a:r>
+              <a:rPr lang="en-US" dirty="0" smtClean="0"/>
+              <a:t>Minecraft</a:t>
+            </a:r>
+            <a:endParaRPr lang="en-US" dirty="0" smtClean="0"/>
           </a:p>
           <a:p>
             <a:pPr lvl="1"/>
             <a:r>
               <a:rPr lang="en-US" dirty="0" smtClean="0"/>
-              <a:t>Example Project: Teleporting Steve</a:t>
+              <a:t>Example Project</a:t>
+            </a:r>
+            <a:r>
+              <a:rPr lang="en-US" smtClean="0"/>
+              <a:t>: </a:t>
+            </a:r>
+            <a:r>
+              <a:rPr lang="en-US" smtClean="0"/>
+              <a:t>Sending Messages</a:t>
             </a:r>
             <a:endParaRPr lang="en-US" dirty="0"/>
           </a:p>
@@ -8427,22 +7229,13 @@
             <a:pPr lvl="1"/>
             <a:r>
               <a:rPr lang="en-GB" dirty="0" smtClean="0"/>
-              <a:t>Python </a:t>
-            </a:r>
+              <a:t>Python 2</a:t>
+            </a:r>
+          </a:p>
+          <a:p>
             <a:r>
               <a:rPr lang="en-GB" dirty="0" smtClean="0"/>
-              <a:t>2</a:t>
-            </a:r>
-            <a:endParaRPr lang="en-GB" dirty="0" smtClean="0"/>
-          </a:p>
-          <a:p>
-            <a:r>
-              <a:rPr lang="en-GB" dirty="0" smtClean="0"/>
-              <a:t>Python is a programming language you will use to interact with Minecraft (make buildings, show messages, etc</a:t>
-            </a:r>
-            <a:r>
-              <a:rPr lang="en-GB" dirty="0" smtClean="0"/>
-              <a:t>.)</a:t>
+              <a:t>Python is a programming language you will use to interact with Minecraft (make buildings, show messages, etc.)</a:t>
             </a:r>
             <a:endParaRPr lang="en-GB" dirty="0"/>
           </a:p>
@@ -8654,11 +7447,6 @@
               </a:rPr>
               <a:t>…</a:t>
             </a:r>
-            <a:endParaRPr lang="en-GB" sz="2000" dirty="0">
-              <a:solidFill>
-                <a:srgbClr val="6E461E"/>
-              </a:solidFill>
-            </a:endParaRPr>
           </a:p>
         </p:txBody>
       </p:sp>
@@ -8751,11 +7539,6 @@
               </a:rPr>
               <a:t>To move the mouse out of Minecraft, press the TAB key first</a:t>
             </a:r>
-            <a:endParaRPr lang="en-GB" sz="2000" dirty="0">
-              <a:solidFill>
-                <a:srgbClr val="6E461E"/>
-              </a:solidFill>
-            </a:endParaRPr>
           </a:p>
         </p:txBody>
       </p:sp>
@@ -9126,13 +7909,8 @@
           <a:p>
             <a:r>
               <a:rPr lang="en-GB" dirty="0" smtClean="0"/>
-              <a:t>Start a new Python window, by clicking ‘File’ and ‘New</a:t>
-            </a:r>
-            <a:r>
-              <a:rPr lang="en-GB" dirty="0" smtClean="0"/>
-              <a:t>.’</a:t>
-            </a:r>
-            <a:endParaRPr lang="en-GB" dirty="0" smtClean="0"/>
+              <a:t>Start a new Python window, by clicking ‘File’ and ‘New.’</a:t>
+            </a:r>
           </a:p>
           <a:p>
             <a:r>
@@ -9270,11 +8048,7 @@
           <a:p>
             <a:r>
               <a:rPr lang="en-GB" dirty="0" smtClean="0"/>
-              <a:t>Try </a:t>
-            </a:r>
-            <a:r>
-              <a:rPr lang="en-GB" dirty="0" smtClean="0"/>
-              <a:t>another few.  What happens with</a:t>
+              <a:t>Try another few.  What happens with</a:t>
             </a:r>
             <a:br>
               <a:rPr lang="en-GB" dirty="0" smtClean="0"/>
@@ -9348,11 +8122,6 @@
               </a:rPr>
               <a:t>Capital letters and spaces MUST be correct, or your code won’t work</a:t>
             </a:r>
-            <a:endParaRPr lang="en-GB" sz="2000" dirty="0">
-              <a:solidFill>
-                <a:srgbClr val="6E461E"/>
-              </a:solidFill>
-            </a:endParaRPr>
           </a:p>
         </p:txBody>
       </p:sp>
@@ -9395,7 +8164,7 @@
       </p:grpSpPr>
       <p:sp>
         <p:nvSpPr>
-          <p:cNvPr id="3" name="Title 2"/>
+          <p:cNvPr id="4" name="Title 3"/>
           <p:cNvSpPr>
             <a:spLocks noGrp="1"/>
           </p:cNvSpPr>
@@ -9403,144 +8172,161 @@
             <p:ph type="title"/>
           </p:nvPr>
         </p:nvSpPr>
-        <p:spPr/>
+        <p:spPr>
+          <a:xfrm>
+            <a:off x="963084" y="1542098"/>
+            <a:ext cx="10363200" cy="1362075"/>
+          </a:xfrm>
+        </p:spPr>
         <p:txBody>
           <a:bodyPr/>
           <a:lstStyle/>
           <a:p>
-            <a:r>
-              <a:rPr lang="en-GB" dirty="0" smtClean="0"/>
-              <a:t>Where am I?</a:t>
-            </a:r>
-            <a:endParaRPr lang="en-GB" dirty="0"/>
-          </a:p>
-        </p:txBody>
-      </p:sp>
-      <p:sp>
-        <p:nvSpPr>
-          <p:cNvPr id="4" name="Content Placeholder 3"/>
-          <p:cNvSpPr>
-            <a:spLocks noGrp="1"/>
-          </p:cNvSpPr>
-          <p:nvPr>
-            <p:ph idx="1"/>
-          </p:nvPr>
-        </p:nvSpPr>
-        <p:spPr/>
+            <a:pPr algn="ctr"/>
+            <a:r>
+              <a:rPr lang="en-US" dirty="0" smtClean="0"/>
+              <a:t>LAB TIME </a:t>
+            </a:r>
+            <a:endParaRPr lang="en-US" dirty="0"/>
+          </a:p>
+        </p:txBody>
+      </p:sp>
+      <p:sp>
+        <p:nvSpPr>
+          <p:cNvPr id="2" name="Text Placeholder 1"/>
+          <p:cNvSpPr>
+            <a:spLocks noGrp="1"/>
+          </p:cNvSpPr>
+          <p:nvPr>
+            <p:ph type="body" idx="1"/>
+          </p:nvPr>
+        </p:nvSpPr>
+        <p:spPr>
+          <a:xfrm>
+            <a:off x="963084" y="2621281"/>
+            <a:ext cx="10363200" cy="3403600"/>
+          </a:xfrm>
+        </p:spPr>
         <p:txBody>
           <a:bodyPr>
             <a:normAutofit/>
           </a:bodyPr>
           <a:lstStyle/>
           <a:p>
-            <a:r>
-              <a:rPr lang="en-GB" dirty="0"/>
-              <a:t>Graphs use X co-ordinates for left-right and Y co-ordinates for </a:t>
-            </a:r>
-            <a:r>
-              <a:rPr lang="en-GB" dirty="0" smtClean="0"/>
-              <a:t>up-down</a:t>
-            </a:r>
-            <a:r>
-              <a:rPr lang="en-GB" dirty="0" smtClean="0"/>
-              <a:t>.</a:t>
-            </a:r>
-            <a:endParaRPr lang="en-GB" dirty="0"/>
-          </a:p>
-          <a:p>
-            <a:r>
-              <a:rPr lang="en-GB" dirty="0" smtClean="0"/>
-              <a:t>Minecraft is a 3D game, so also has forwards-backwards movement</a:t>
-            </a:r>
-            <a:r>
-              <a:rPr lang="en-GB" dirty="0" smtClean="0"/>
-              <a:t>.</a:t>
-            </a:r>
-            <a:endParaRPr lang="en-GB" dirty="0" smtClean="0"/>
-          </a:p>
-          <a:p>
-            <a:r>
-              <a:rPr lang="en-GB" dirty="0" smtClean="0"/>
-              <a:t>X = Left-Right</a:t>
-            </a:r>
-            <a:br>
-              <a:rPr lang="en-GB" dirty="0" smtClean="0"/>
-            </a:br>
-            <a:r>
-              <a:rPr lang="en-GB" dirty="0" smtClean="0"/>
-              <a:t>Y = Up-Down</a:t>
-            </a:r>
-            <a:br>
-              <a:rPr lang="en-GB" dirty="0" smtClean="0"/>
-            </a:br>
-            <a:r>
-              <a:rPr lang="en-GB" dirty="0" smtClean="0"/>
-              <a:t>Z = Forward-Backward</a:t>
-            </a:r>
-          </a:p>
-          <a:p>
-            <a:endParaRPr lang="en-GB" dirty="0"/>
-          </a:p>
-        </p:txBody>
-      </p:sp>
-      <p:pic>
-        <p:nvPicPr>
-          <p:cNvPr id="4098" name="Picture 2" descr="http://3.bp.blogspot.com/-QuFkAXMKZ3Y/UWRn6s4PX-I/AAAAAAAADTM/ycDhEHjrOyc/s1600/Minecraft+-+XYZ.png"/>
-          <p:cNvPicPr>
-            <a:picLocks noChangeAspect="1" noChangeArrowheads="1"/>
-          </p:cNvPicPr>
-          <p:nvPr/>
-        </p:nvPicPr>
-        <p:blipFill>
-          <a:blip r:embed="rId2">
-            <a:extLst>
-              <a:ext uri="{28A0092B-C50C-407E-A947-70E740481C1C}">
-                <a14:useLocalDpi xmlns:a14="http://schemas.microsoft.com/office/drawing/2010/main" val="0"/>
-              </a:ext>
-            </a:extLst>
-          </a:blip>
-          <a:srcRect/>
-          <a:stretch>
-            <a:fillRect/>
-          </a:stretch>
-        </p:blipFill>
-        <p:spPr bwMode="auto">
-          <a:xfrm>
-            <a:off x="8040216" y="3270839"/>
-            <a:ext cx="3196744" cy="3326167"/>
-          </a:xfrm>
-          <a:prstGeom prst="rect">
-            <a:avLst/>
-          </a:prstGeom>
-          <a:noFill/>
-          <a:extLst>
-            <a:ext uri="{909E8E84-426E-40DD-AFC4-6F175D3DCCD1}">
-              <a14:hiddenFill xmlns:a14="http://schemas.microsoft.com/office/drawing/2010/main">
+            <a:pPr marL="457200" indent="-457200">
+              <a:buFont typeface="Arial" charset="0"/>
+              <a:buChar char="•"/>
+            </a:pPr>
+            <a:r>
+              <a:rPr lang="en-US" dirty="0" smtClean="0">
                 <a:solidFill>
-                  <a:srgbClr val="FFFFFF"/>
+                  <a:schemeClr val="tx1"/>
                 </a:solidFill>
-              </a14:hiddenFill>
-            </a:ext>
-          </a:extLst>
-        </p:spPr>
-      </p:pic>
+              </a:rPr>
+              <a:t>Use the remainder of class to explore the teleport code. Try different values and see where Steve goes!</a:t>
+            </a:r>
+            <a:endParaRPr lang="en-US" dirty="0">
+              <a:solidFill>
+                <a:schemeClr val="tx1"/>
+              </a:solidFill>
+            </a:endParaRPr>
+          </a:p>
+          <a:p>
+            <a:pPr marL="457200" indent="-457200">
+              <a:buFont typeface="Arial" charset="0"/>
+              <a:buChar char="•"/>
+            </a:pPr>
+            <a:r>
+              <a:rPr lang="en-US" dirty="0" smtClean="0">
+                <a:solidFill>
+                  <a:schemeClr val="tx1"/>
+                </a:solidFill>
+              </a:rPr>
+              <a:t>You can leave when you’re finished.</a:t>
+            </a:r>
+            <a:endParaRPr lang="en-US" dirty="0">
+              <a:solidFill>
+                <a:schemeClr val="tx1"/>
+              </a:solidFill>
+            </a:endParaRPr>
+          </a:p>
+          <a:p>
+            <a:pPr marL="457200" indent="-457200">
+              <a:buFont typeface="Arial" charset="0"/>
+              <a:buChar char="•"/>
+            </a:pPr>
+            <a:r>
+              <a:rPr lang="en-US" b="1" dirty="0" smtClean="0">
+                <a:solidFill>
+                  <a:schemeClr val="tx1"/>
+                </a:solidFill>
+              </a:rPr>
+              <a:t>DO NOT DISTURB </a:t>
+            </a:r>
+            <a:r>
+              <a:rPr lang="en-US" dirty="0" smtClean="0">
+                <a:solidFill>
+                  <a:schemeClr val="tx1"/>
+                </a:solidFill>
+              </a:rPr>
+              <a:t>the other classes!</a:t>
+            </a:r>
+            <a:endParaRPr lang="en-US" b="1" dirty="0">
+              <a:solidFill>
+                <a:schemeClr val="tx1"/>
+              </a:solidFill>
+            </a:endParaRPr>
+          </a:p>
+          <a:p>
+            <a:pPr marL="457200" indent="-457200">
+              <a:buFont typeface="Arial" charset="0"/>
+              <a:buChar char="•"/>
+            </a:pPr>
+            <a:endParaRPr lang="en-US" dirty="0" smtClean="0">
+              <a:solidFill>
+                <a:schemeClr val="tx1"/>
+              </a:solidFill>
+            </a:endParaRPr>
+          </a:p>
+          <a:p>
+            <a:pPr algn="ctr"/>
+            <a:r>
+              <a:rPr lang="en-US" b="1" dirty="0" smtClean="0">
+                <a:solidFill>
+                  <a:srgbClr val="FF0000"/>
+                </a:solidFill>
+              </a:rPr>
+              <a:t>REMEMBER TO SHUTDOWN YOUR RASPBERRY PI</a:t>
+            </a:r>
+          </a:p>
+          <a:p>
+            <a:pPr algn="ctr"/>
+            <a:r>
+              <a:rPr lang="en-US" b="1" dirty="0" smtClean="0">
+                <a:solidFill>
+                  <a:srgbClr val="FF0000"/>
+                </a:solidFill>
+              </a:rPr>
+              <a:t>DO NOT POWER IT OFF UNTIL YOU SHUTDOWN</a:t>
+            </a:r>
+            <a:endParaRPr lang="en-US" b="1" dirty="0">
+              <a:solidFill>
+                <a:srgbClr val="FF0000"/>
+              </a:solidFill>
+            </a:endParaRPr>
+          </a:p>
+        </p:txBody>
+      </p:sp>
     </p:spTree>
     <p:extLst>
       <p:ext uri="{BB962C8B-B14F-4D97-AF65-F5344CB8AC3E}">
-        <p14:creationId xmlns:p14="http://schemas.microsoft.com/office/powerpoint/2010/main" val="407514777"/>
+        <p14:creationId xmlns:p14="http://schemas.microsoft.com/office/powerpoint/2010/main" val="2013213598"/>
       </p:ext>
     </p:extLst>
   </p:cSld>
   <p:clrMapOvr>
     <a:masterClrMapping/>
   </p:clrMapOvr>
-  <p:timing>
-    <p:tnLst>
-      <p:par>
-        <p:cTn id="1" dur="indefinite" restart="never" nodeType="tmRoot"/>
-      </p:par>
-    </p:tnLst>
-  </p:timing>
 </p:sld>
 </file>
 
@@ -9563,420 +8349,37 @@
       </p:grpSpPr>
       <p:sp>
         <p:nvSpPr>
-          <p:cNvPr id="3" name="Title 2"/>
+          <p:cNvPr id="4" name="Title 3"/>
           <p:cNvSpPr>
             <a:spLocks noGrp="1"/>
           </p:cNvSpPr>
           <p:nvPr>
             <p:ph type="title"/>
           </p:nvPr>
-        </p:nvSpPr>
-        <p:spPr/>
-        <p:txBody>
-          <a:bodyPr/>
-          <a:lstStyle/>
-          <a:p>
-            <a:r>
-              <a:rPr lang="en-GB" dirty="0" smtClean="0"/>
-              <a:t>There I am!</a:t>
-            </a:r>
-            <a:endParaRPr lang="en-GB" dirty="0"/>
-          </a:p>
-        </p:txBody>
-      </p:sp>
-      <p:sp>
-        <p:nvSpPr>
-          <p:cNvPr id="4" name="Content Placeholder 3"/>
-          <p:cNvSpPr>
-            <a:spLocks noGrp="1"/>
-          </p:cNvSpPr>
-          <p:nvPr>
-            <p:ph idx="1"/>
-          </p:nvPr>
-        </p:nvSpPr>
-        <p:spPr/>
-        <p:txBody>
-          <a:bodyPr/>
-          <a:lstStyle/>
-          <a:p>
-            <a:r>
-              <a:rPr lang="en-US" dirty="0" smtClean="0"/>
-              <a:t>Coordinates are shown in upper-left corner on screen.</a:t>
-            </a:r>
-            <a:endParaRPr lang="en-US" dirty="0"/>
-          </a:p>
-        </p:txBody>
-      </p:sp>
-      <p:pic>
-        <p:nvPicPr>
-          <p:cNvPr id="5122" name="Picture 2" descr="http://4.bp.blogspot.com/-0eZL8CJSHKA/UWRoIvkYEjI/AAAAAAAADT8/X_MNwyudpI4/s1600/minecraft-helloworld.jpg"/>
-          <p:cNvPicPr>
-            <a:picLocks noChangeAspect="1" noChangeArrowheads="1"/>
-          </p:cNvPicPr>
-          <p:nvPr/>
-        </p:nvPicPr>
-        <p:blipFill>
-          <a:blip r:embed="rId2">
-            <a:extLst>
-              <a:ext uri="{28A0092B-C50C-407E-A947-70E740481C1C}">
-                <a14:useLocalDpi xmlns:a14="http://schemas.microsoft.com/office/drawing/2010/main" val="0"/>
-              </a:ext>
-            </a:extLst>
-          </a:blip>
-          <a:srcRect/>
-          <a:stretch>
-            <a:fillRect/>
-          </a:stretch>
-        </p:blipFill>
-        <p:spPr bwMode="auto">
-          <a:xfrm>
-            <a:off x="3645386" y="2265508"/>
-            <a:ext cx="7563148" cy="4424441"/>
-          </a:xfrm>
-          <a:prstGeom prst="rect">
-            <a:avLst/>
-          </a:prstGeom>
-          <a:noFill/>
-          <a:extLst>
-            <a:ext uri="{909E8E84-426E-40DD-AFC4-6F175D3DCCD1}">
-              <a14:hiddenFill xmlns:a14="http://schemas.microsoft.com/office/drawing/2010/main">
-                <a:solidFill>
-                  <a:srgbClr val="FFFFFF"/>
-                </a:solidFill>
-              </a14:hiddenFill>
-            </a:ext>
-          </a:extLst>
-        </p:spPr>
-      </p:pic>
-      <p:cxnSp>
-        <p:nvCxnSpPr>
-          <p:cNvPr id="5" name="Straight Arrow Connector 4"/>
-          <p:cNvCxnSpPr/>
-          <p:nvPr/>
-        </p:nvCxnSpPr>
-        <p:spPr>
-          <a:xfrm flipV="1">
-            <a:off x="1940560" y="2631440"/>
-            <a:ext cx="2001520" cy="1656080"/>
-          </a:xfrm>
-          <a:prstGeom prst="straightConnector1">
-            <a:avLst/>
-          </a:prstGeom>
-          <a:ln w="92075">
-            <a:solidFill>
-              <a:srgbClr val="FF0000"/>
-            </a:solidFill>
-            <a:tailEnd type="arrow"/>
-          </a:ln>
-        </p:spPr>
-        <p:style>
-          <a:lnRef idx="1">
-            <a:schemeClr val="accent1"/>
-          </a:lnRef>
-          <a:fillRef idx="0">
-            <a:schemeClr val="accent1"/>
-          </a:fillRef>
-          <a:effectRef idx="0">
-            <a:schemeClr val="accent1"/>
-          </a:effectRef>
-          <a:fontRef idx="minor">
-            <a:schemeClr val="tx1"/>
-          </a:fontRef>
-        </p:style>
-      </p:cxnSp>
-      <p:sp>
-        <p:nvSpPr>
-          <p:cNvPr id="6" name="TextBox 5"/>
-          <p:cNvSpPr txBox="1"/>
-          <p:nvPr/>
         </p:nvSpPr>
         <p:spPr>
           <a:xfrm>
-            <a:off x="5375920" y="1124744"/>
-            <a:ext cx="1728192" cy="400110"/>
+            <a:off x="685800" y="2381693"/>
+            <a:ext cx="10820400" cy="1174306"/>
           </a:xfrm>
-          <a:prstGeom prst="rect">
-            <a:avLst/>
-          </a:prstGeom>
-          <a:noFill/>
         </p:spPr>
         <p:txBody>
-          <a:bodyPr wrap="square" rtlCol="0">
-            <a:spAutoFit/>
-          </a:bodyPr>
-          <a:lstStyle/>
-          <a:p>
-            <a:r>
-              <a:rPr lang="en-GB" sz="2000" b="1" dirty="0">
-                <a:solidFill>
-                  <a:schemeClr val="bg1"/>
-                </a:solidFill>
-              </a:rPr>
-              <a:t>( -3, 33, 97 )</a:t>
-            </a:r>
-            <a:endParaRPr lang="en-GB" sz="2000" b="1" dirty="0">
-              <a:solidFill>
-                <a:schemeClr val="bg1"/>
-              </a:solidFill>
-            </a:endParaRPr>
+          <a:bodyPr/>
+          <a:lstStyle/>
+          <a:p>
+            <a:pPr algn="ctr"/>
+            <a:r>
+              <a:rPr lang="en-US" dirty="0" smtClean="0"/>
+              <a:t>Questions or comments?</a:t>
+            </a:r>
+            <a:endParaRPr lang="en-US" dirty="0"/>
           </a:p>
         </p:txBody>
       </p:sp>
     </p:spTree>
     <p:extLst>
       <p:ext uri="{BB962C8B-B14F-4D97-AF65-F5344CB8AC3E}">
-        <p14:creationId xmlns:p14="http://schemas.microsoft.com/office/powerpoint/2010/main" val="775506756"/>
-      </p:ext>
-    </p:extLst>
-  </p:cSld>
-  <p:clrMapOvr>
-    <a:masterClrMapping/>
-  </p:clrMapOvr>
-  <p:timing>
-    <p:tnLst>
-      <p:par>
-        <p:cTn id="1" dur="indefinite" restart="never" nodeType="tmRoot"/>
-      </p:par>
-    </p:tnLst>
-  </p:timing>
-</p:sld>
-</file>
-
-<file path=ppt/slides/slide29.xml><?xml version="1.0" encoding="utf-8"?>
-<p:sld xmlns:a="http://schemas.openxmlformats.org/drawingml/2006/main" xmlns:r="http://schemas.openxmlformats.org/officeDocument/2006/relationships" xmlns:p="http://schemas.openxmlformats.org/presentationml/2006/main">
-  <p:cSld>
-    <p:spTree>
-      <p:nvGrpSpPr>
-        <p:cNvPr id="1" name=""/>
-        <p:cNvGrpSpPr/>
-        <p:nvPr/>
-      </p:nvGrpSpPr>
-      <p:grpSpPr>
-        <a:xfrm>
-          <a:off x="0" y="0"/>
-          <a:ext cx="0" cy="0"/>
-          <a:chOff x="0" y="0"/>
-          <a:chExt cx="0" cy="0"/>
-        </a:xfrm>
-      </p:grpSpPr>
-      <p:sp>
-        <p:nvSpPr>
-          <p:cNvPr id="2" name="Title 1"/>
-          <p:cNvSpPr>
-            <a:spLocks noGrp="1"/>
-          </p:cNvSpPr>
-          <p:nvPr>
-            <p:ph type="title"/>
-          </p:nvPr>
-        </p:nvSpPr>
-        <p:spPr/>
-        <p:txBody>
-          <a:bodyPr/>
-          <a:lstStyle/>
-          <a:p>
-            <a:r>
-              <a:rPr lang="en-US" dirty="0" smtClean="0"/>
-              <a:t>Get Position</a:t>
-            </a:r>
-            <a:endParaRPr lang="en-US" dirty="0"/>
-          </a:p>
-        </p:txBody>
-      </p:sp>
-      <p:sp>
-        <p:nvSpPr>
-          <p:cNvPr id="3" name="Content Placeholder 2"/>
-          <p:cNvSpPr>
-            <a:spLocks noGrp="1"/>
-          </p:cNvSpPr>
-          <p:nvPr>
-            <p:ph idx="1"/>
-          </p:nvPr>
-        </p:nvSpPr>
-        <p:spPr/>
-        <p:txBody>
-          <a:bodyPr>
-            <a:normAutofit fontScale="92500" lnSpcReduction="20000"/>
-          </a:bodyPr>
-          <a:lstStyle/>
-          <a:p>
-            <a:r>
-              <a:rPr lang="en-US" dirty="0" smtClean="0"/>
-              <a:t>You can get Steve’s position and display it in Python.</a:t>
-            </a:r>
-          </a:p>
-          <a:p>
-            <a:r>
-              <a:rPr lang="en-US" dirty="0" smtClean="0"/>
-              <a:t>Let’s try it now. Open a new file and enter this:</a:t>
-            </a:r>
-          </a:p>
-          <a:p>
-            <a:pPr marL="0" indent="0">
-              <a:spcBef>
-                <a:spcPts val="0"/>
-              </a:spcBef>
-              <a:buNone/>
-            </a:pPr>
-            <a:endParaRPr lang="en-US" sz="3000" dirty="0" smtClean="0">
-              <a:latin typeface="Courier New" charset="0"/>
-              <a:ea typeface="Courier New" charset="0"/>
-              <a:cs typeface="Courier New" charset="0"/>
-            </a:endParaRPr>
-          </a:p>
-          <a:p>
-            <a:pPr marL="0" indent="0">
-              <a:spcBef>
-                <a:spcPts val="0"/>
-              </a:spcBef>
-              <a:buNone/>
-            </a:pPr>
-            <a:r>
-              <a:rPr lang="en-US" sz="3000" dirty="0" smtClean="0">
-                <a:latin typeface="Courier New" charset="0"/>
-                <a:ea typeface="Courier New" charset="0"/>
-                <a:cs typeface="Courier New" charset="0"/>
-              </a:rPr>
-              <a:t># </a:t>
-            </a:r>
-            <a:r>
-              <a:rPr lang="en-US" sz="3000" dirty="0">
-                <a:latin typeface="Courier New" charset="0"/>
-                <a:ea typeface="Courier New" charset="0"/>
-                <a:cs typeface="Courier New" charset="0"/>
-              </a:rPr>
-              <a:t>Connect to Minecraft</a:t>
-            </a:r>
-          </a:p>
-          <a:p>
-            <a:pPr marL="0" indent="0">
-              <a:spcBef>
-                <a:spcPts val="0"/>
-              </a:spcBef>
-              <a:buNone/>
-            </a:pPr>
-            <a:r>
-              <a:rPr lang="en-US" sz="3000" dirty="0">
-                <a:latin typeface="Courier New" charset="0"/>
-                <a:ea typeface="Courier New" charset="0"/>
-                <a:cs typeface="Courier New" charset="0"/>
-              </a:rPr>
-              <a:t>from mcpi.minecraft import Minecraft</a:t>
-            </a:r>
-          </a:p>
-          <a:p>
-            <a:pPr marL="0" indent="0">
-              <a:spcBef>
-                <a:spcPts val="0"/>
-              </a:spcBef>
-              <a:buNone/>
-            </a:pPr>
-            <a:r>
-              <a:rPr lang="en-US" sz="3000" dirty="0">
-                <a:latin typeface="Courier New" charset="0"/>
-                <a:ea typeface="Courier New" charset="0"/>
-                <a:cs typeface="Courier New" charset="0"/>
-              </a:rPr>
-              <a:t>mc = Minecraft.create()</a:t>
-            </a:r>
-          </a:p>
-          <a:p>
-            <a:pPr marL="0" indent="0">
-              <a:spcBef>
-                <a:spcPts val="0"/>
-              </a:spcBef>
-              <a:buNone/>
-            </a:pPr>
-            <a:r>
-              <a:rPr lang="en-US" sz="3000" dirty="0">
-                <a:latin typeface="Courier New" charset="0"/>
-                <a:ea typeface="Courier New" charset="0"/>
-                <a:cs typeface="Courier New" charset="0"/>
-              </a:rPr>
-              <a:t> </a:t>
-            </a:r>
-          </a:p>
-          <a:p>
-            <a:pPr marL="0" indent="0">
-              <a:spcBef>
-                <a:spcPts val="0"/>
-              </a:spcBef>
-              <a:buNone/>
-            </a:pPr>
-            <a:r>
-              <a:rPr lang="en-US" sz="3000" dirty="0">
-                <a:latin typeface="Courier New" charset="0"/>
-                <a:ea typeface="Courier New" charset="0"/>
-                <a:cs typeface="Courier New" charset="0"/>
-              </a:rPr>
-              <a:t># Get the player's position and display it</a:t>
-            </a:r>
-          </a:p>
-          <a:p>
-            <a:pPr marL="0" indent="0">
-              <a:spcBef>
-                <a:spcPts val="0"/>
-              </a:spcBef>
-              <a:buNone/>
-            </a:pPr>
-            <a:r>
-              <a:rPr lang="en-US" sz="3000" dirty="0">
-                <a:latin typeface="Courier New" charset="0"/>
-                <a:ea typeface="Courier New" charset="0"/>
-                <a:cs typeface="Courier New" charset="0"/>
-              </a:rPr>
-              <a:t>pos = mc.player.getPos()</a:t>
-            </a:r>
-          </a:p>
-          <a:p>
-            <a:pPr marL="0" indent="0">
-              <a:spcBef>
-                <a:spcPts val="0"/>
-              </a:spcBef>
-              <a:buNone/>
-            </a:pPr>
-            <a:r>
-              <a:rPr lang="en-US" sz="3000" dirty="0">
-                <a:latin typeface="Courier New" charset="0"/>
-                <a:ea typeface="Courier New" charset="0"/>
-                <a:cs typeface="Courier New" charset="0"/>
-              </a:rPr>
-              <a:t>print pos.x, pos.y, </a:t>
-            </a:r>
-            <a:r>
-              <a:rPr lang="en-US" sz="3000" dirty="0" smtClean="0">
-                <a:latin typeface="Courier New" charset="0"/>
-                <a:ea typeface="Courier New" charset="0"/>
-                <a:cs typeface="Courier New" charset="0"/>
-              </a:rPr>
-              <a:t>pos.z</a:t>
-            </a:r>
-          </a:p>
-          <a:p>
-            <a:pPr marL="0" indent="0">
-              <a:spcBef>
-                <a:spcPts val="0"/>
-              </a:spcBef>
-              <a:buNone/>
-            </a:pPr>
-            <a:endParaRPr lang="en-US" sz="3000" dirty="0" smtClean="0">
-              <a:latin typeface="Courier New" charset="0"/>
-              <a:ea typeface="Courier New" charset="0"/>
-              <a:cs typeface="Courier New" charset="0"/>
-            </a:endParaRPr>
-          </a:p>
-          <a:p>
-            <a:r>
-              <a:rPr lang="en-US" dirty="0" smtClean="0"/>
-              <a:t>Move Steve around and re-run the code.</a:t>
-            </a:r>
-            <a:endParaRPr lang="en-US" dirty="0"/>
-          </a:p>
-        </p:txBody>
-      </p:sp>
-    </p:spTree>
-    <p:extLst>
-      <p:ext uri="{BB962C8B-B14F-4D97-AF65-F5344CB8AC3E}">
-        <p14:creationId xmlns:p14="http://schemas.microsoft.com/office/powerpoint/2010/main" val="2087065735"/>
+        <p14:creationId xmlns:p14="http://schemas.microsoft.com/office/powerpoint/2010/main" val="408753220"/>
       </p:ext>
     </p:extLst>
   </p:cSld>
@@ -10063,1674 +8466,6 @@
     <p:extLst>
       <p:ext uri="{BB962C8B-B14F-4D97-AF65-F5344CB8AC3E}">
         <p14:creationId xmlns:p14="http://schemas.microsoft.com/office/powerpoint/2010/main" val="919817583"/>
-      </p:ext>
-    </p:extLst>
-  </p:cSld>
-  <p:clrMapOvr>
-    <a:masterClrMapping/>
-  </p:clrMapOvr>
-  <p:timing>
-    <p:tnLst>
-      <p:par>
-        <p:cTn id="1" dur="indefinite" restart="never" nodeType="tmRoot"/>
-      </p:par>
-    </p:tnLst>
-  </p:timing>
-</p:sld>
-</file>
-
-<file path=ppt/slides/slide30.xml><?xml version="1.0" encoding="utf-8"?>
-<p:sld xmlns:a="http://schemas.openxmlformats.org/drawingml/2006/main" xmlns:r="http://schemas.openxmlformats.org/officeDocument/2006/relationships" xmlns:p="http://schemas.openxmlformats.org/presentationml/2006/main">
-  <p:cSld>
-    <p:spTree>
-      <p:nvGrpSpPr>
-        <p:cNvPr id="1" name=""/>
-        <p:cNvGrpSpPr/>
-        <p:nvPr/>
-      </p:nvGrpSpPr>
-      <p:grpSpPr>
-        <a:xfrm>
-          <a:off x="0" y="0"/>
-          <a:ext cx="0" cy="0"/>
-          <a:chOff x="0" y="0"/>
-          <a:chExt cx="0" cy="0"/>
-        </a:xfrm>
-      </p:grpSpPr>
-      <p:sp>
-        <p:nvSpPr>
-          <p:cNvPr id="3" name="Title 2"/>
-          <p:cNvSpPr>
-            <a:spLocks noGrp="1"/>
-          </p:cNvSpPr>
-          <p:nvPr>
-            <p:ph type="title"/>
-          </p:nvPr>
-        </p:nvSpPr>
-        <p:spPr/>
-        <p:txBody>
-          <a:bodyPr/>
-          <a:lstStyle/>
-          <a:p>
-            <a:r>
-              <a:rPr lang="en-GB" dirty="0" smtClean="0"/>
-              <a:t>Teleporting</a:t>
-            </a:r>
-            <a:endParaRPr lang="en-GB" dirty="0"/>
-          </a:p>
-        </p:txBody>
-      </p:sp>
-      <p:sp>
-        <p:nvSpPr>
-          <p:cNvPr id="2" name="Content Placeholder 1"/>
-          <p:cNvSpPr>
-            <a:spLocks noGrp="1"/>
-          </p:cNvSpPr>
-          <p:nvPr>
-            <p:ph idx="1"/>
-          </p:nvPr>
-        </p:nvSpPr>
-        <p:spPr/>
-        <p:txBody>
-          <a:bodyPr>
-            <a:normAutofit fontScale="70000" lnSpcReduction="20000"/>
-          </a:bodyPr>
-          <a:lstStyle/>
-          <a:p>
-            <a:r>
-              <a:rPr lang="en-GB" dirty="0" smtClean="0"/>
-              <a:t>Start a new Python window by clicking ‘File’ and ‘New’.  Click in this new window and type this code</a:t>
-            </a:r>
-            <a:r>
-              <a:rPr lang="en-GB" dirty="0" smtClean="0"/>
-              <a:t>.</a:t>
-            </a:r>
-            <a:endParaRPr lang="en-GB" dirty="0"/>
-          </a:p>
-          <a:p>
-            <a:pPr marL="301943" lvl="1" indent="0">
-              <a:spcBef>
-                <a:spcPts val="0"/>
-              </a:spcBef>
-              <a:buNone/>
-            </a:pPr>
-            <a:endParaRPr lang="en-GB" sz="2600" dirty="0" smtClean="0">
-              <a:latin typeface="Courier New" panose="02070309020205020404" pitchFamily="49" charset="0"/>
-              <a:cs typeface="Courier New" panose="02070309020205020404" pitchFamily="49" charset="0"/>
-            </a:endParaRPr>
-          </a:p>
-          <a:p>
-            <a:pPr marL="301943" lvl="1" indent="0">
-              <a:spcBef>
-                <a:spcPts val="0"/>
-              </a:spcBef>
-              <a:buNone/>
-            </a:pPr>
-            <a:r>
-              <a:rPr lang="en-GB" sz="2600" dirty="0" smtClean="0">
-                <a:latin typeface="Courier New" panose="02070309020205020404" pitchFamily="49" charset="0"/>
-                <a:cs typeface="Courier New" panose="02070309020205020404" pitchFamily="49" charset="0"/>
-              </a:rPr>
-              <a:t>import </a:t>
-            </a:r>
-            <a:r>
-              <a:rPr lang="en-GB" sz="2600" dirty="0">
-                <a:latin typeface="Courier New" panose="02070309020205020404" pitchFamily="49" charset="0"/>
-                <a:cs typeface="Courier New" panose="02070309020205020404" pitchFamily="49" charset="0"/>
-              </a:rPr>
-              <a:t>mcpi.minecraft as minecraft</a:t>
-            </a:r>
-          </a:p>
-          <a:p>
-            <a:pPr marL="301943" lvl="1" indent="0">
-              <a:spcBef>
-                <a:spcPts val="0"/>
-              </a:spcBef>
-              <a:buNone/>
-            </a:pPr>
-            <a:r>
-              <a:rPr lang="en-GB" sz="2600" dirty="0">
-                <a:latin typeface="Courier New" panose="02070309020205020404" pitchFamily="49" charset="0"/>
-                <a:cs typeface="Courier New" panose="02070309020205020404" pitchFamily="49" charset="0"/>
-              </a:rPr>
-              <a:t>i</a:t>
-            </a:r>
-            <a:r>
-              <a:rPr lang="en-GB" sz="2600" dirty="0">
-                <a:latin typeface="Courier New" panose="02070309020205020404" pitchFamily="49" charset="0"/>
-                <a:cs typeface="Courier New" panose="02070309020205020404" pitchFamily="49" charset="0"/>
-              </a:rPr>
-              <a:t>mport time</a:t>
-            </a:r>
-          </a:p>
-          <a:p>
-            <a:pPr marL="301943" lvl="1" indent="0">
-              <a:spcBef>
-                <a:spcPts val="0"/>
-              </a:spcBef>
-              <a:buNone/>
-            </a:pPr>
-            <a:endParaRPr lang="en-GB" sz="2600" dirty="0">
-              <a:latin typeface="Courier New" panose="02070309020205020404" pitchFamily="49" charset="0"/>
-              <a:cs typeface="Courier New" panose="02070309020205020404" pitchFamily="49" charset="0"/>
-            </a:endParaRPr>
-          </a:p>
-          <a:p>
-            <a:pPr marL="301943" lvl="1" indent="0">
-              <a:spcBef>
-                <a:spcPts val="0"/>
-              </a:spcBef>
-              <a:buNone/>
-            </a:pPr>
-            <a:r>
-              <a:rPr lang="en-GB" sz="2600" dirty="0">
-                <a:latin typeface="Courier New" panose="02070309020205020404" pitchFamily="49" charset="0"/>
-                <a:cs typeface="Courier New" panose="02070309020205020404" pitchFamily="49" charset="0"/>
-              </a:rPr>
-              <a:t>mc = minecraft.Minecraft.create()</a:t>
-            </a:r>
-          </a:p>
-          <a:p>
-            <a:pPr marL="301943" lvl="1" indent="0">
-              <a:spcBef>
-                <a:spcPts val="0"/>
-              </a:spcBef>
-              <a:buNone/>
-            </a:pPr>
-            <a:endParaRPr lang="en-GB" sz="2600" dirty="0">
-              <a:latin typeface="Courier New" panose="02070309020205020404" pitchFamily="49" charset="0"/>
-              <a:cs typeface="Courier New" panose="02070309020205020404" pitchFamily="49" charset="0"/>
-            </a:endParaRPr>
-          </a:p>
-          <a:p>
-            <a:pPr marL="301943" lvl="1" indent="0">
-              <a:spcBef>
-                <a:spcPts val="0"/>
-              </a:spcBef>
-              <a:buNone/>
-            </a:pPr>
-            <a:r>
-              <a:rPr lang="en-GB" sz="2600" dirty="0">
-                <a:latin typeface="Courier New" panose="02070309020205020404" pitchFamily="49" charset="0"/>
-                <a:cs typeface="Courier New" panose="02070309020205020404" pitchFamily="49" charset="0"/>
-              </a:rPr>
-              <a:t>time.sleep(1)</a:t>
-            </a:r>
-          </a:p>
-          <a:p>
-            <a:pPr marL="301943" lvl="1" indent="0">
-              <a:spcBef>
-                <a:spcPts val="0"/>
-              </a:spcBef>
-              <a:buNone/>
-            </a:pPr>
-            <a:r>
-              <a:rPr lang="en-GB" sz="2600" dirty="0">
-                <a:latin typeface="Courier New" panose="02070309020205020404" pitchFamily="49" charset="0"/>
-                <a:cs typeface="Courier New" panose="02070309020205020404" pitchFamily="49" charset="0"/>
-              </a:rPr>
-              <a:t>p</a:t>
-            </a:r>
-            <a:r>
-              <a:rPr lang="en-GB" sz="2600" dirty="0">
-                <a:latin typeface="Courier New" panose="02070309020205020404" pitchFamily="49" charset="0"/>
-                <a:cs typeface="Courier New" panose="02070309020205020404" pitchFamily="49" charset="0"/>
-              </a:rPr>
-              <a:t>os = mc.player.getPos()</a:t>
-            </a:r>
-          </a:p>
-          <a:p>
-            <a:pPr marL="301943" lvl="1" indent="0">
-              <a:spcBef>
-                <a:spcPts val="0"/>
-              </a:spcBef>
-              <a:buNone/>
-            </a:pPr>
-            <a:r>
-              <a:rPr lang="en-GB" sz="2600" dirty="0">
-                <a:latin typeface="Courier New" panose="02070309020205020404" pitchFamily="49" charset="0"/>
-                <a:cs typeface="Courier New" panose="02070309020205020404" pitchFamily="49" charset="0"/>
-              </a:rPr>
-              <a:t>mc.postToChat(“You are located x=“ +str(pos.x) + “, </a:t>
-            </a:r>
-            <a:endParaRPr lang="en-GB" sz="2600" dirty="0" smtClean="0">
-              <a:latin typeface="Courier New" panose="02070309020205020404" pitchFamily="49" charset="0"/>
-              <a:cs typeface="Courier New" panose="02070309020205020404" pitchFamily="49" charset="0"/>
-            </a:endParaRPr>
-          </a:p>
-          <a:p>
-            <a:pPr marL="301943" lvl="1" indent="0">
-              <a:spcBef>
-                <a:spcPts val="0"/>
-              </a:spcBef>
-              <a:buNone/>
-            </a:pPr>
-            <a:r>
-              <a:rPr lang="en-GB" sz="2600" dirty="0" smtClean="0">
-                <a:latin typeface="Courier New" panose="02070309020205020404" pitchFamily="49" charset="0"/>
-                <a:cs typeface="Courier New" panose="02070309020205020404" pitchFamily="49" charset="0"/>
-              </a:rPr>
-              <a:t>              y</a:t>
-            </a:r>
-            <a:r>
-              <a:rPr lang="en-GB" sz="2600" dirty="0">
-                <a:latin typeface="Courier New" panose="02070309020205020404" pitchFamily="49" charset="0"/>
-                <a:cs typeface="Courier New" panose="02070309020205020404" pitchFamily="49" charset="0"/>
-              </a:rPr>
-              <a:t>=“ +str(pos.y) +”, </a:t>
-            </a:r>
-            <a:r>
-              <a:rPr lang="en-GB" sz="2600" dirty="0" smtClean="0">
-                <a:latin typeface="Courier New" panose="02070309020205020404" pitchFamily="49" charset="0"/>
-                <a:cs typeface="Courier New" panose="02070309020205020404" pitchFamily="49" charset="0"/>
-              </a:rPr>
-              <a:t>z</a:t>
-            </a:r>
-            <a:r>
-              <a:rPr lang="en-GB" sz="2600" dirty="0">
-                <a:latin typeface="Courier New" panose="02070309020205020404" pitchFamily="49" charset="0"/>
-                <a:cs typeface="Courier New" panose="02070309020205020404" pitchFamily="49" charset="0"/>
-              </a:rPr>
-              <a:t>=“ +str(pos.z))</a:t>
-            </a:r>
-          </a:p>
-          <a:p>
-            <a:pPr marL="301943" lvl="1" indent="0">
-              <a:spcBef>
-                <a:spcPts val="0"/>
-              </a:spcBef>
-              <a:buNone/>
-            </a:pPr>
-            <a:endParaRPr lang="en-GB" sz="2600" dirty="0">
-              <a:latin typeface="Courier New" panose="02070309020205020404" pitchFamily="49" charset="0"/>
-              <a:cs typeface="Courier New" panose="02070309020205020404" pitchFamily="49" charset="0"/>
-            </a:endParaRPr>
-          </a:p>
-          <a:p>
-            <a:pPr marL="301943" lvl="1" indent="0">
-              <a:spcBef>
-                <a:spcPts val="0"/>
-              </a:spcBef>
-              <a:buNone/>
-            </a:pPr>
-            <a:r>
-              <a:rPr lang="en-GB" sz="2600" dirty="0">
-                <a:latin typeface="Courier New" panose="02070309020205020404" pitchFamily="49" charset="0"/>
-                <a:cs typeface="Courier New" panose="02070309020205020404" pitchFamily="49" charset="0"/>
-              </a:rPr>
-              <a:t>time.sleep(2)</a:t>
-            </a:r>
-          </a:p>
-          <a:p>
-            <a:pPr marL="301943" lvl="1" indent="0">
-              <a:spcBef>
-                <a:spcPts val="0"/>
-              </a:spcBef>
-              <a:buNone/>
-            </a:pPr>
-            <a:r>
-              <a:rPr lang="en-GB" sz="2600" dirty="0">
-                <a:latin typeface="Courier New" panose="02070309020205020404" pitchFamily="49" charset="0"/>
-                <a:cs typeface="Courier New" panose="02070309020205020404" pitchFamily="49" charset="0"/>
-              </a:rPr>
-              <a:t>mc.postToChat(“Get ready to fall from the sky!”)</a:t>
-            </a:r>
-          </a:p>
-          <a:p>
-            <a:pPr marL="301943" lvl="1" indent="0">
-              <a:spcBef>
-                <a:spcPts val="0"/>
-              </a:spcBef>
-              <a:buNone/>
-            </a:pPr>
-            <a:endParaRPr lang="en-GB" sz="2600" dirty="0">
-              <a:latin typeface="Courier New" panose="02070309020205020404" pitchFamily="49" charset="0"/>
-              <a:cs typeface="Courier New" panose="02070309020205020404" pitchFamily="49" charset="0"/>
-            </a:endParaRPr>
-          </a:p>
-          <a:p>
-            <a:pPr marL="301943" lvl="1" indent="0">
-              <a:spcBef>
-                <a:spcPts val="0"/>
-              </a:spcBef>
-              <a:buNone/>
-            </a:pPr>
-            <a:r>
-              <a:rPr lang="en-GB" sz="2600" dirty="0">
-                <a:latin typeface="Courier New" panose="02070309020205020404" pitchFamily="49" charset="0"/>
-                <a:cs typeface="Courier New" panose="02070309020205020404" pitchFamily="49" charset="0"/>
-              </a:rPr>
-              <a:t>time.sleep(5)</a:t>
-            </a:r>
-          </a:p>
-          <a:p>
-            <a:pPr marL="301943" lvl="1" indent="0">
-              <a:spcBef>
-                <a:spcPts val="0"/>
-              </a:spcBef>
-              <a:buNone/>
-            </a:pPr>
-            <a:r>
-              <a:rPr lang="en-GB" sz="2600" dirty="0">
-                <a:latin typeface="Courier New" panose="02070309020205020404" pitchFamily="49" charset="0"/>
-                <a:cs typeface="Courier New" panose="02070309020205020404" pitchFamily="49" charset="0"/>
-              </a:rPr>
-              <a:t>mc.player.setPos(pos.x, pos.y + 60, pos.z)</a:t>
-            </a:r>
-            <a:r>
-              <a:rPr lang="en-GB" sz="1800" dirty="0">
-                <a:latin typeface="Courier New" panose="02070309020205020404" pitchFamily="49" charset="0"/>
-                <a:cs typeface="Courier New" panose="02070309020205020404" pitchFamily="49" charset="0"/>
-              </a:rPr>
-              <a:t/>
-            </a:r>
-            <a:br>
-              <a:rPr lang="en-GB" sz="1800" dirty="0">
-                <a:latin typeface="Courier New" panose="02070309020205020404" pitchFamily="49" charset="0"/>
-                <a:cs typeface="Courier New" panose="02070309020205020404" pitchFamily="49" charset="0"/>
-              </a:rPr>
-            </a:br>
-            <a:endParaRPr lang="en-GB" sz="1800" dirty="0">
-              <a:latin typeface="Courier New" panose="02070309020205020404" pitchFamily="49" charset="0"/>
-              <a:cs typeface="Courier New" panose="02070309020205020404" pitchFamily="49" charset="0"/>
-            </a:endParaRPr>
-          </a:p>
-          <a:p>
-            <a:r>
-              <a:rPr lang="en-GB" dirty="0" smtClean="0"/>
-              <a:t>Click </a:t>
-            </a:r>
-            <a:r>
-              <a:rPr lang="en-GB" dirty="0"/>
-              <a:t>on File and save your code in </a:t>
-            </a:r>
-            <a:r>
-              <a:rPr lang="en-GB" dirty="0" smtClean="0"/>
-              <a:t>your Pi </a:t>
-            </a:r>
-            <a:r>
-              <a:rPr lang="en-GB" dirty="0"/>
-              <a:t>‘Documents’ folder as </a:t>
-            </a:r>
-            <a:r>
-              <a:rPr lang="en-GB" b="1" dirty="0" smtClean="0"/>
-              <a:t>teleport.py</a:t>
-            </a:r>
-            <a:endParaRPr lang="en-GB" b="1" dirty="0"/>
-          </a:p>
-        </p:txBody>
-      </p:sp>
-    </p:spTree>
-    <p:extLst>
-      <p:ext uri="{BB962C8B-B14F-4D97-AF65-F5344CB8AC3E}">
-        <p14:creationId xmlns:p14="http://schemas.microsoft.com/office/powerpoint/2010/main" val="863794449"/>
-      </p:ext>
-    </p:extLst>
-  </p:cSld>
-  <p:clrMapOvr>
-    <a:masterClrMapping/>
-  </p:clrMapOvr>
-  <p:timing>
-    <p:tnLst>
-      <p:par>
-        <p:cTn id="1" dur="indefinite" restart="never" nodeType="tmRoot"/>
-      </p:par>
-    </p:tnLst>
-  </p:timing>
-</p:sld>
-</file>
-
-<file path=ppt/slides/slide31.xml><?xml version="1.0" encoding="utf-8"?>
-<p:sld xmlns:a="http://schemas.openxmlformats.org/drawingml/2006/main" xmlns:r="http://schemas.openxmlformats.org/officeDocument/2006/relationships" xmlns:p="http://schemas.openxmlformats.org/presentationml/2006/main">
-  <p:cSld>
-    <p:spTree>
-      <p:nvGrpSpPr>
-        <p:cNvPr id="1" name=""/>
-        <p:cNvGrpSpPr/>
-        <p:nvPr/>
-      </p:nvGrpSpPr>
-      <p:grpSpPr>
-        <a:xfrm>
-          <a:off x="0" y="0"/>
-          <a:ext cx="0" cy="0"/>
-          <a:chOff x="0" y="0"/>
-          <a:chExt cx="0" cy="0"/>
-        </a:xfrm>
-      </p:grpSpPr>
-      <p:sp>
-        <p:nvSpPr>
-          <p:cNvPr id="2" name="Title 1"/>
-          <p:cNvSpPr>
-            <a:spLocks noGrp="1"/>
-          </p:cNvSpPr>
-          <p:nvPr>
-            <p:ph type="title"/>
-          </p:nvPr>
-        </p:nvSpPr>
-        <p:spPr/>
-        <p:txBody>
-          <a:bodyPr/>
-          <a:lstStyle/>
-          <a:p>
-            <a:r>
-              <a:rPr lang="en-US" dirty="0" smtClean="0"/>
-              <a:t>What we learned in Python</a:t>
-            </a:r>
-            <a:endParaRPr lang="en-US" dirty="0"/>
-          </a:p>
-        </p:txBody>
-      </p:sp>
-      <p:sp>
-        <p:nvSpPr>
-          <p:cNvPr id="3" name="Content Placeholder 2"/>
-          <p:cNvSpPr>
-            <a:spLocks noGrp="1"/>
-          </p:cNvSpPr>
-          <p:nvPr>
-            <p:ph idx="1"/>
-          </p:nvPr>
-        </p:nvSpPr>
-        <p:spPr/>
-        <p:txBody>
-          <a:bodyPr/>
-          <a:lstStyle/>
-          <a:p>
-            <a:r>
-              <a:rPr lang="en-US" dirty="0" smtClean="0"/>
-              <a:t>Connecting to the Minecraft API</a:t>
-            </a:r>
-          </a:p>
-          <a:p>
-            <a:r>
-              <a:rPr lang="en-US" dirty="0" smtClean="0"/>
-              <a:t>Using API functions</a:t>
-            </a:r>
-          </a:p>
-          <a:p>
-            <a:r>
-              <a:rPr lang="en-US" dirty="0" smtClean="0"/>
-              <a:t>Using variables</a:t>
-            </a:r>
-          </a:p>
-          <a:p>
-            <a:r>
-              <a:rPr lang="en-US" dirty="0" smtClean="0"/>
-              <a:t>Printing messages</a:t>
-            </a:r>
-          </a:p>
-          <a:p>
-            <a:endParaRPr lang="en-US" dirty="0"/>
-          </a:p>
-        </p:txBody>
-      </p:sp>
-    </p:spTree>
-    <p:extLst>
-      <p:ext uri="{BB962C8B-B14F-4D97-AF65-F5344CB8AC3E}">
-        <p14:creationId xmlns:p14="http://schemas.microsoft.com/office/powerpoint/2010/main" val="1957170627"/>
-      </p:ext>
-    </p:extLst>
-  </p:cSld>
-  <p:clrMapOvr>
-    <a:masterClrMapping/>
-  </p:clrMapOvr>
-  <p:timing>
-    <p:tnLst>
-      <p:par>
-        <p:cTn id="1" dur="indefinite" restart="never" nodeType="tmRoot"/>
-      </p:par>
-    </p:tnLst>
-  </p:timing>
-</p:sld>
-</file>
-
-<file path=ppt/slides/slide32.xml><?xml version="1.0" encoding="utf-8"?>
-<p:sld xmlns:a="http://schemas.openxmlformats.org/drawingml/2006/main" xmlns:r="http://schemas.openxmlformats.org/officeDocument/2006/relationships" xmlns:p="http://schemas.openxmlformats.org/presentationml/2006/main">
-  <p:cSld>
-    <p:spTree>
-      <p:nvGrpSpPr>
-        <p:cNvPr id="1" name=""/>
-        <p:cNvGrpSpPr/>
-        <p:nvPr/>
-      </p:nvGrpSpPr>
-      <p:grpSpPr>
-        <a:xfrm>
-          <a:off x="0" y="0"/>
-          <a:ext cx="0" cy="0"/>
-          <a:chOff x="0" y="0"/>
-          <a:chExt cx="0" cy="0"/>
-        </a:xfrm>
-      </p:grpSpPr>
-      <p:sp>
-        <p:nvSpPr>
-          <p:cNvPr id="82946" name="Rectangle 2"/>
-          <p:cNvSpPr>
-            <a:spLocks noGrp="1" noChangeArrowheads="1"/>
-          </p:cNvSpPr>
-          <p:nvPr>
-            <p:ph type="title"/>
-          </p:nvPr>
-        </p:nvSpPr>
-        <p:spPr/>
-        <p:txBody>
-          <a:bodyPr/>
-          <a:lstStyle/>
-          <a:p>
-            <a:pPr eaLnBrk="1" hangingPunct="1">
-              <a:defRPr/>
-            </a:pPr>
-            <a:r>
-              <a:rPr lang="en-US" dirty="0" smtClean="0"/>
-              <a:t>Keywords</a:t>
-            </a:r>
-          </a:p>
-        </p:txBody>
-      </p:sp>
-      <p:sp>
-        <p:nvSpPr>
-          <p:cNvPr id="82947" name="Rectangle 3"/>
-          <p:cNvSpPr>
-            <a:spLocks noGrp="1" noChangeArrowheads="1"/>
-          </p:cNvSpPr>
-          <p:nvPr>
-            <p:ph idx="1"/>
-          </p:nvPr>
-        </p:nvSpPr>
-        <p:spPr/>
-        <p:txBody>
-          <a:bodyPr/>
-          <a:lstStyle/>
-          <a:p>
-            <a:pPr eaLnBrk="1" hangingPunct="1">
-              <a:buFont typeface="Arial" charset="0"/>
-              <a:buChar char="•"/>
-              <a:defRPr/>
-            </a:pPr>
-            <a:r>
-              <a:rPr lang="en-US" i="1" dirty="0" smtClean="0"/>
-              <a:t>Keywords</a:t>
-            </a:r>
-            <a:r>
-              <a:rPr lang="en-US" dirty="0" smtClean="0"/>
-              <a:t> are reserved words that have special meaning in the Python language. Because they are reserved, they can not be used as identifiers. Examples of keywords are </a:t>
-            </a:r>
-            <a:r>
-              <a:rPr lang="en-US" i="1" dirty="0" smtClean="0"/>
-              <a:t>if, while, class, import</a:t>
-            </a:r>
-            <a:r>
-              <a:rPr lang="en-US" dirty="0" smtClean="0"/>
-              <a:t>. </a:t>
-            </a:r>
-          </a:p>
-        </p:txBody>
-      </p:sp>
-    </p:spTree>
-    <p:extLst>
-      <p:ext uri="{BB962C8B-B14F-4D97-AF65-F5344CB8AC3E}">
-        <p14:creationId xmlns:p14="http://schemas.microsoft.com/office/powerpoint/2010/main" val="174315019"/>
-      </p:ext>
-    </p:extLst>
-  </p:cSld>
-  <p:clrMapOvr>
-    <a:masterClrMapping/>
-  </p:clrMapOvr>
-  <p:timing>
-    <p:tnLst>
-      <p:par>
-        <p:cTn id="1" dur="indefinite" restart="never" nodeType="tmRoot"/>
-      </p:par>
-    </p:tnLst>
-  </p:timing>
-</p:sld>
-</file>
-
-<file path=ppt/slides/slide33.xml><?xml version="1.0" encoding="utf-8"?>
-<p:sld xmlns:a="http://schemas.openxmlformats.org/drawingml/2006/main" xmlns:r="http://schemas.openxmlformats.org/officeDocument/2006/relationships" xmlns:p="http://schemas.openxmlformats.org/presentationml/2006/main" showMasterPhAnim="0">
-  <p:cSld>
-    <p:spTree>
-      <p:nvGrpSpPr>
-        <p:cNvPr id="1" name=""/>
-        <p:cNvGrpSpPr/>
-        <p:nvPr/>
-      </p:nvGrpSpPr>
-      <p:grpSpPr>
-        <a:xfrm>
-          <a:off x="0" y="0"/>
-          <a:ext cx="0" cy="0"/>
-          <a:chOff x="0" y="0"/>
-          <a:chExt cx="0" cy="0"/>
-        </a:xfrm>
-      </p:grpSpPr>
-      <p:sp>
-        <p:nvSpPr>
-          <p:cNvPr id="63490" name="Rectangle 2"/>
-          <p:cNvSpPr>
-            <a:spLocks noGrp="1" noChangeArrowheads="1"/>
-          </p:cNvSpPr>
-          <p:nvPr>
-            <p:ph type="title"/>
-          </p:nvPr>
-        </p:nvSpPr>
-        <p:spPr/>
-        <p:txBody>
-          <a:bodyPr/>
-          <a:lstStyle/>
-          <a:p>
-            <a:pPr eaLnBrk="1" hangingPunct="1">
-              <a:defRPr/>
-            </a:pPr>
-            <a:r>
-              <a:rPr lang="en-US" dirty="0" smtClean="0"/>
-              <a:t>Variables in Python</a:t>
-            </a:r>
-          </a:p>
-        </p:txBody>
-      </p:sp>
-      <p:sp>
-        <p:nvSpPr>
-          <p:cNvPr id="63491" name="Rectangle 3"/>
-          <p:cNvSpPr>
-            <a:spLocks noGrp="1" noChangeArrowheads="1"/>
-          </p:cNvSpPr>
-          <p:nvPr>
-            <p:ph idx="1"/>
-          </p:nvPr>
-        </p:nvSpPr>
-        <p:spPr/>
-        <p:txBody>
-          <a:bodyPr>
-            <a:normAutofit/>
-          </a:bodyPr>
-          <a:lstStyle/>
-          <a:p>
-            <a:pPr>
-              <a:lnSpc>
-                <a:spcPct val="80000"/>
-              </a:lnSpc>
-              <a:defRPr/>
-            </a:pPr>
-            <a:r>
-              <a:rPr lang="en-US" sz="3500" dirty="0"/>
-              <a:t>A variable </a:t>
-            </a:r>
-            <a:r>
-              <a:rPr lang="en-US" sz="3500" dirty="0" smtClean="0"/>
-              <a:t>has</a:t>
-            </a:r>
-          </a:p>
-          <a:p>
-            <a:pPr lvl="1">
-              <a:lnSpc>
-                <a:spcPct val="80000"/>
-              </a:lnSpc>
-              <a:defRPr/>
-            </a:pPr>
-            <a:r>
-              <a:rPr lang="en-US" sz="3200" dirty="0" smtClean="0"/>
-              <a:t>A </a:t>
-            </a:r>
-            <a:r>
-              <a:rPr lang="en-US" sz="3200" dirty="0"/>
-              <a:t>name – </a:t>
-            </a:r>
-            <a:r>
-              <a:rPr lang="en-US" sz="3200" dirty="0" smtClean="0"/>
-              <a:t>identifier</a:t>
-            </a:r>
-          </a:p>
-          <a:p>
-            <a:pPr lvl="1">
-              <a:lnSpc>
-                <a:spcPct val="80000"/>
-              </a:lnSpc>
-              <a:defRPr/>
-            </a:pPr>
-            <a:r>
-              <a:rPr lang="en-US" sz="3200" dirty="0" smtClean="0"/>
-              <a:t>A </a:t>
-            </a:r>
-            <a:r>
-              <a:rPr lang="en-US" sz="3200" dirty="0"/>
-              <a:t>data type - int, float, strings, etc. (determined by context implicitly or converted explicitly)</a:t>
-            </a:r>
-          </a:p>
-          <a:p>
-            <a:pPr marL="1066774" lvl="3" indent="-457189">
-              <a:lnSpc>
-                <a:spcPct val="80000"/>
-              </a:lnSpc>
-              <a:defRPr/>
-            </a:pPr>
-            <a:r>
-              <a:rPr lang="en-US" sz="3200" dirty="0"/>
-              <a:t>num = 1 + 2</a:t>
-            </a:r>
-          </a:p>
-          <a:p>
-            <a:pPr marL="1066774" lvl="3" indent="-457189">
-              <a:lnSpc>
-                <a:spcPct val="80000"/>
-              </a:lnSpc>
-              <a:defRPr/>
-            </a:pPr>
-            <a:r>
-              <a:rPr lang="en-US" sz="3200" dirty="0"/>
-              <a:t>num = float(25) / </a:t>
-            </a:r>
-            <a:r>
-              <a:rPr lang="en-US" sz="3200" dirty="0" smtClean="0"/>
-              <a:t>2.5</a:t>
-            </a:r>
-            <a:endParaRPr lang="en-US" sz="3200" dirty="0"/>
-          </a:p>
-        </p:txBody>
-      </p:sp>
-    </p:spTree>
-    <p:extLst>
-      <p:ext uri="{BB962C8B-B14F-4D97-AF65-F5344CB8AC3E}">
-        <p14:creationId xmlns:p14="http://schemas.microsoft.com/office/powerpoint/2010/main" val="84597967"/>
-      </p:ext>
-    </p:extLst>
-  </p:cSld>
-  <p:clrMapOvr>
-    <a:masterClrMapping/>
-  </p:clrMapOvr>
-  <p:timing>
-    <p:tnLst>
-      <p:par>
-        <p:cTn id="1" dur="indefinite" restart="never" nodeType="tmRoot"/>
-      </p:par>
-    </p:tnLst>
-  </p:timing>
-</p:sld>
-</file>
-
-<file path=ppt/slides/slide34.xml><?xml version="1.0" encoding="utf-8"?>
-<p:sld xmlns:a="http://schemas.openxmlformats.org/drawingml/2006/main" xmlns:r="http://schemas.openxmlformats.org/officeDocument/2006/relationships" xmlns:p="http://schemas.openxmlformats.org/presentationml/2006/main">
-  <p:cSld>
-    <p:spTree>
-      <p:nvGrpSpPr>
-        <p:cNvPr id="1" name=""/>
-        <p:cNvGrpSpPr/>
-        <p:nvPr/>
-      </p:nvGrpSpPr>
-      <p:grpSpPr>
-        <a:xfrm>
-          <a:off x="0" y="0"/>
-          <a:ext cx="0" cy="0"/>
-          <a:chOff x="0" y="0"/>
-          <a:chExt cx="0" cy="0"/>
-        </a:xfrm>
-      </p:grpSpPr>
-      <p:sp>
-        <p:nvSpPr>
-          <p:cNvPr id="66562" name="Rectangle 2"/>
-          <p:cNvSpPr>
-            <a:spLocks noGrp="1" noChangeArrowheads="1"/>
-          </p:cNvSpPr>
-          <p:nvPr>
-            <p:ph type="title"/>
-          </p:nvPr>
-        </p:nvSpPr>
-        <p:spPr/>
-        <p:txBody>
-          <a:bodyPr/>
-          <a:lstStyle/>
-          <a:p>
-            <a:pPr eaLnBrk="1" hangingPunct="1">
-              <a:defRPr/>
-            </a:pPr>
-            <a:r>
-              <a:rPr lang="en-US" dirty="0" smtClean="0"/>
-              <a:t>Integer operators</a:t>
-            </a:r>
-          </a:p>
-        </p:txBody>
-      </p:sp>
-      <p:sp>
-        <p:nvSpPr>
-          <p:cNvPr id="66563" name="Rectangle 3"/>
-          <p:cNvSpPr>
-            <a:spLocks noGrp="1" noChangeArrowheads="1"/>
-          </p:cNvSpPr>
-          <p:nvPr>
-            <p:ph idx="1"/>
-          </p:nvPr>
-        </p:nvSpPr>
-        <p:spPr/>
-        <p:txBody>
-          <a:bodyPr>
-            <a:noAutofit/>
-          </a:bodyPr>
-          <a:lstStyle/>
-          <a:p>
-            <a:pPr>
-              <a:lnSpc>
-                <a:spcPct val="90000"/>
-              </a:lnSpc>
-              <a:buSzTx/>
-              <a:defRPr/>
-            </a:pPr>
-            <a:r>
-              <a:rPr lang="en-US" sz="2800" dirty="0"/>
-              <a:t>The operations for integers are:</a:t>
-            </a:r>
-          </a:p>
-          <a:p>
-            <a:pPr lvl="1">
-              <a:lnSpc>
-                <a:spcPct val="90000"/>
-              </a:lnSpc>
-              <a:defRPr/>
-            </a:pPr>
-            <a:r>
-              <a:rPr lang="en-US" sz="2800" dirty="0"/>
-              <a:t>+ for addition</a:t>
-            </a:r>
-          </a:p>
-          <a:p>
-            <a:pPr lvl="1">
-              <a:lnSpc>
-                <a:spcPct val="90000"/>
-              </a:lnSpc>
-              <a:defRPr/>
-            </a:pPr>
-            <a:r>
-              <a:rPr lang="en-US" sz="2800" dirty="0"/>
-              <a:t>- for subtraction</a:t>
-            </a:r>
-          </a:p>
-          <a:p>
-            <a:pPr lvl="1">
-              <a:lnSpc>
-                <a:spcPct val="90000"/>
-              </a:lnSpc>
-              <a:defRPr/>
-            </a:pPr>
-            <a:r>
-              <a:rPr lang="en-US" sz="2800" dirty="0"/>
-              <a:t>* for multiplication</a:t>
-            </a:r>
-          </a:p>
-          <a:p>
-            <a:pPr lvl="1">
-              <a:lnSpc>
-                <a:spcPct val="90000"/>
-              </a:lnSpc>
-              <a:defRPr/>
-            </a:pPr>
-            <a:r>
-              <a:rPr lang="en-US" sz="2800" dirty="0"/>
-              <a:t>/ for integer division: 14/5 = 2</a:t>
-            </a:r>
-          </a:p>
-          <a:p>
-            <a:pPr lvl="1">
-              <a:lnSpc>
-                <a:spcPct val="90000"/>
-              </a:lnSpc>
-              <a:defRPr/>
-            </a:pPr>
-            <a:r>
-              <a:rPr lang="en-US" sz="2800" dirty="0"/>
-              <a:t>/ for floating point division: 14.0/5.0 = 2.8 </a:t>
-            </a:r>
-          </a:p>
-          <a:p>
-            <a:pPr lvl="1">
-              <a:lnSpc>
-                <a:spcPct val="90000"/>
-              </a:lnSpc>
-              <a:defRPr/>
-            </a:pPr>
-            <a:r>
-              <a:rPr lang="en-US" sz="2800" dirty="0"/>
-              <a:t>% for remainder: 14 % 5 = 4</a:t>
-            </a:r>
-          </a:p>
-          <a:p>
-            <a:pPr>
-              <a:lnSpc>
-                <a:spcPct val="90000"/>
-              </a:lnSpc>
-              <a:defRPr/>
-            </a:pPr>
-            <a:r>
-              <a:rPr lang="en-US" sz="2800" dirty="0"/>
-              <a:t>*, /, % take precedence over +, -</a:t>
-            </a:r>
-          </a:p>
-          <a:p>
-            <a:pPr lvl="1">
-              <a:lnSpc>
-                <a:spcPct val="90000"/>
-              </a:lnSpc>
-              <a:defRPr/>
-            </a:pPr>
-            <a:r>
-              <a:rPr lang="en-US" sz="2800" dirty="0"/>
-              <a:t>x + y * z will do y*z first</a:t>
-            </a:r>
-          </a:p>
-          <a:p>
-            <a:pPr>
-              <a:lnSpc>
-                <a:spcPct val="90000"/>
-              </a:lnSpc>
-              <a:defRPr/>
-            </a:pPr>
-            <a:r>
-              <a:rPr lang="en-US" sz="2800" dirty="0"/>
-              <a:t>Use parentheses to dictate order you want.</a:t>
-            </a:r>
-          </a:p>
-          <a:p>
-            <a:pPr lvl="1">
-              <a:lnSpc>
-                <a:spcPct val="90000"/>
-              </a:lnSpc>
-              <a:defRPr/>
-            </a:pPr>
-            <a:r>
-              <a:rPr lang="en-US" sz="2800" dirty="0"/>
-              <a:t>(x+y) * z will do x+y first</a:t>
-            </a:r>
-            <a:r>
-              <a:rPr lang="en-US" sz="2800" dirty="0" smtClean="0"/>
-              <a:t>.</a:t>
-            </a:r>
-            <a:endParaRPr lang="en-US" sz="2800" dirty="0"/>
-          </a:p>
-        </p:txBody>
-      </p:sp>
-    </p:spTree>
-    <p:extLst>
-      <p:ext uri="{BB962C8B-B14F-4D97-AF65-F5344CB8AC3E}">
-        <p14:creationId xmlns:p14="http://schemas.microsoft.com/office/powerpoint/2010/main" val="989106420"/>
-      </p:ext>
-    </p:extLst>
-  </p:cSld>
-  <p:clrMapOvr>
-    <a:masterClrMapping/>
-  </p:clrMapOvr>
-  <p:timing>
-    <p:tnLst>
-      <p:par>
-        <p:cTn id="1" dur="indefinite" restart="never" nodeType="tmRoot"/>
-      </p:par>
-    </p:tnLst>
-  </p:timing>
-</p:sld>
-</file>
-
-<file path=ppt/slides/slide35.xml><?xml version="1.0" encoding="utf-8"?>
-<p:sld xmlns:a="http://schemas.openxmlformats.org/drawingml/2006/main" xmlns:r="http://schemas.openxmlformats.org/officeDocument/2006/relationships" xmlns:p="http://schemas.openxmlformats.org/presentationml/2006/main">
-  <p:cSld>
-    <p:spTree>
-      <p:nvGrpSpPr>
-        <p:cNvPr id="1" name=""/>
-        <p:cNvGrpSpPr/>
-        <p:nvPr/>
-      </p:nvGrpSpPr>
-      <p:grpSpPr>
-        <a:xfrm>
-          <a:off x="0" y="0"/>
-          <a:ext cx="0" cy="0"/>
-          <a:chOff x="0" y="0"/>
-          <a:chExt cx="0" cy="0"/>
-        </a:xfrm>
-      </p:grpSpPr>
-      <p:sp>
-        <p:nvSpPr>
-          <p:cNvPr id="69634" name="Rectangle 2"/>
-          <p:cNvSpPr>
-            <a:spLocks noGrp="1" noChangeArrowheads="1"/>
-          </p:cNvSpPr>
-          <p:nvPr>
-            <p:ph type="title"/>
-          </p:nvPr>
-        </p:nvSpPr>
-        <p:spPr/>
-        <p:txBody>
-          <a:bodyPr/>
-          <a:lstStyle/>
-          <a:p>
-            <a:pPr eaLnBrk="1" hangingPunct="1">
-              <a:defRPr/>
-            </a:pPr>
-            <a:r>
-              <a:rPr lang="en-US" dirty="0" smtClean="0"/>
-              <a:t>Python Assignment Statements</a:t>
-            </a:r>
-          </a:p>
-        </p:txBody>
-      </p:sp>
-      <p:sp>
-        <p:nvSpPr>
-          <p:cNvPr id="69635" name="Rectangle 3"/>
-          <p:cNvSpPr>
-            <a:spLocks noGrp="1" noChangeArrowheads="1"/>
-          </p:cNvSpPr>
-          <p:nvPr>
-            <p:ph idx="1"/>
-          </p:nvPr>
-        </p:nvSpPr>
-        <p:spPr/>
-        <p:txBody>
-          <a:bodyPr>
-            <a:normAutofit/>
-          </a:bodyPr>
-          <a:lstStyle/>
-          <a:p>
-            <a:pPr>
-              <a:lnSpc>
-                <a:spcPct val="90000"/>
-              </a:lnSpc>
-              <a:buFont typeface="Arial" charset="0"/>
-              <a:buChar char="•"/>
-              <a:defRPr/>
-            </a:pPr>
-            <a:r>
-              <a:rPr lang="en-US" dirty="0"/>
-              <a:t>In </a:t>
-            </a:r>
-            <a:r>
-              <a:rPr lang="en-US" dirty="0"/>
-              <a:t>Python, = is called the </a:t>
-            </a:r>
-            <a:r>
-              <a:rPr lang="en-US" b="1" dirty="0"/>
-              <a:t>assignment operator </a:t>
-            </a:r>
-            <a:r>
-              <a:rPr lang="en-US" dirty="0"/>
-              <a:t>and an assignment statement has the </a:t>
-            </a:r>
-            <a:r>
-              <a:rPr lang="en-US" dirty="0" smtClean="0"/>
-              <a:t>form</a:t>
-            </a:r>
-            <a:r>
-              <a:rPr lang="en-US" dirty="0"/>
-              <a:t/>
-            </a:r>
-            <a:br>
-              <a:rPr lang="en-US" dirty="0"/>
-            </a:br>
-            <a:r>
-              <a:rPr lang="en-US" dirty="0"/>
-              <a:t>           </a:t>
-            </a:r>
-            <a:r>
-              <a:rPr lang="en-US" dirty="0">
-                <a:latin typeface="Courier New" charset="0"/>
-                <a:ea typeface="Courier New" charset="0"/>
-                <a:cs typeface="Courier New" charset="0"/>
-              </a:rPr>
-              <a:t>&lt;variable&gt; = &lt;expression</a:t>
-            </a:r>
-            <a:r>
-              <a:rPr lang="en-US" dirty="0">
-                <a:latin typeface="Courier New" charset="0"/>
-                <a:ea typeface="Courier New" charset="0"/>
-                <a:cs typeface="Courier New" charset="0"/>
-              </a:rPr>
-              <a:t>&gt;</a:t>
-            </a:r>
-            <a:endParaRPr lang="en-US" dirty="0">
-              <a:latin typeface="Courier New" charset="0"/>
-              <a:ea typeface="Courier New" charset="0"/>
-              <a:cs typeface="Courier New" charset="0"/>
-            </a:endParaRPr>
-          </a:p>
-          <a:p>
-            <a:pPr>
-              <a:lnSpc>
-                <a:spcPct val="90000"/>
-              </a:lnSpc>
-              <a:buFont typeface="Arial" charset="0"/>
-              <a:buChar char="•"/>
-              <a:defRPr/>
-            </a:pPr>
-            <a:r>
-              <a:rPr lang="en-US" dirty="0"/>
-              <a:t>Here, </a:t>
-            </a:r>
-            <a:r>
-              <a:rPr lang="en-US" b="1" dirty="0"/>
-              <a:t>&lt;</a:t>
-            </a:r>
-            <a:r>
-              <a:rPr lang="en-US" b="1" dirty="0"/>
-              <a:t>variable&gt; </a:t>
-            </a:r>
-            <a:r>
-              <a:rPr lang="en-US" dirty="0"/>
-              <a:t>would be replaced by an actual </a:t>
-            </a:r>
-            <a:r>
-              <a:rPr lang="en-US" dirty="0"/>
-              <a:t>variable and </a:t>
-            </a:r>
-            <a:r>
-              <a:rPr lang="en-US" b="1" dirty="0"/>
-              <a:t>&lt;</a:t>
-            </a:r>
-            <a:r>
-              <a:rPr lang="en-US" b="1" dirty="0"/>
-              <a:t>expression&gt;</a:t>
-            </a:r>
-            <a:r>
-              <a:rPr lang="en-US" dirty="0"/>
-              <a:t> would be replaced by an </a:t>
-            </a:r>
-            <a:r>
-              <a:rPr lang="en-US" dirty="0"/>
-              <a:t>expression</a:t>
-            </a:r>
-          </a:p>
-        </p:txBody>
-      </p:sp>
-    </p:spTree>
-    <p:extLst>
-      <p:ext uri="{BB962C8B-B14F-4D97-AF65-F5344CB8AC3E}">
-        <p14:creationId xmlns:p14="http://schemas.microsoft.com/office/powerpoint/2010/main" val="1556937690"/>
-      </p:ext>
-    </p:extLst>
-  </p:cSld>
-  <p:clrMapOvr>
-    <a:masterClrMapping/>
-  </p:clrMapOvr>
-  <p:timing>
-    <p:tnLst>
-      <p:par>
-        <p:cTn id="1" dur="indefinite" restart="never" nodeType="tmRoot"/>
-      </p:par>
-    </p:tnLst>
-  </p:timing>
-</p:sld>
-</file>
-
-<file path=ppt/slides/slide36.xml><?xml version="1.0" encoding="utf-8"?>
-<p:sld xmlns:a="http://schemas.openxmlformats.org/drawingml/2006/main" xmlns:r="http://schemas.openxmlformats.org/officeDocument/2006/relationships" xmlns:p="http://schemas.openxmlformats.org/presentationml/2006/main">
-  <p:cSld>
-    <p:spTree>
-      <p:nvGrpSpPr>
-        <p:cNvPr id="1" name=""/>
-        <p:cNvGrpSpPr/>
-        <p:nvPr/>
-      </p:nvGrpSpPr>
-      <p:grpSpPr>
-        <a:xfrm>
-          <a:off x="0" y="0"/>
-          <a:ext cx="0" cy="0"/>
-          <a:chOff x="0" y="0"/>
-          <a:chExt cx="0" cy="0"/>
-        </a:xfrm>
-      </p:grpSpPr>
-      <p:sp>
-        <p:nvSpPr>
-          <p:cNvPr id="73730" name="Rectangle 2"/>
-          <p:cNvSpPr>
-            <a:spLocks noGrp="1" noChangeArrowheads="1"/>
-          </p:cNvSpPr>
-          <p:nvPr>
-            <p:ph type="title"/>
-          </p:nvPr>
-        </p:nvSpPr>
-        <p:spPr/>
-        <p:txBody>
-          <a:bodyPr/>
-          <a:lstStyle/>
-          <a:p>
-            <a:pPr eaLnBrk="1" hangingPunct="1">
-              <a:defRPr/>
-            </a:pPr>
-            <a:r>
-              <a:rPr lang="en-US" dirty="0" smtClean="0"/>
-              <a:t>Comments</a:t>
-            </a:r>
-          </a:p>
-        </p:txBody>
-      </p:sp>
-      <p:sp>
-        <p:nvSpPr>
-          <p:cNvPr id="73731" name="Rectangle 3"/>
-          <p:cNvSpPr>
-            <a:spLocks noGrp="1" noChangeArrowheads="1"/>
-          </p:cNvSpPr>
-          <p:nvPr>
-            <p:ph idx="1"/>
-          </p:nvPr>
-        </p:nvSpPr>
-        <p:spPr/>
-        <p:txBody>
-          <a:bodyPr>
-            <a:normAutofit fontScale="62500" lnSpcReduction="20000"/>
-          </a:bodyPr>
-          <a:lstStyle/>
-          <a:p>
-            <a:pPr eaLnBrk="1" hangingPunct="1">
-              <a:buFont typeface="Arial" charset="0"/>
-              <a:buChar char="•"/>
-              <a:defRPr/>
-            </a:pPr>
-            <a:r>
-              <a:rPr lang="en-US" sz="4800" dirty="0"/>
-              <a:t>Often we want to put some documentation in our program. These are comments for explanation, but not executed by the computer.</a:t>
-            </a:r>
-          </a:p>
-          <a:p>
-            <a:pPr eaLnBrk="1" hangingPunct="1">
-              <a:buFont typeface="Arial" charset="0"/>
-              <a:buChar char="•"/>
-              <a:defRPr/>
-            </a:pPr>
-            <a:r>
-              <a:rPr lang="en-US" sz="4800" dirty="0"/>
-              <a:t>If we have # anywhere on a line, everything following this on the line is a comment – ignored</a:t>
-            </a:r>
-          </a:p>
-          <a:p>
-            <a:pPr eaLnBrk="1" hangingPunct="1">
-              <a:buFont typeface="Arial" charset="0"/>
-              <a:buChar char="•"/>
-              <a:defRPr/>
-            </a:pPr>
-            <a:r>
-              <a:rPr lang="en-US" sz="4800" dirty="0"/>
-              <a:t>It is always a good practice to document your code! </a:t>
-            </a:r>
-          </a:p>
-          <a:p>
-            <a:pPr eaLnBrk="1" hangingPunct="1">
-              <a:buFont typeface="Arial" charset="0"/>
-              <a:buChar char="•"/>
-              <a:defRPr/>
-            </a:pPr>
-            <a:r>
-              <a:rPr lang="en-US" sz="4800" dirty="0"/>
-              <a:t>Not only to let others know what it does, but to remind yourself as well!</a:t>
-            </a:r>
-          </a:p>
-          <a:p>
-            <a:pPr marL="0" indent="0">
-              <a:spcBef>
-                <a:spcPts val="0"/>
-              </a:spcBef>
-              <a:buNone/>
-            </a:pPr>
-            <a:endParaRPr lang="en-US" dirty="0" smtClean="0">
-              <a:solidFill>
-                <a:schemeClr val="accent4">
-                  <a:lumMod val="75000"/>
-                </a:schemeClr>
-              </a:solidFill>
-              <a:latin typeface="Courier New" charset="0"/>
-              <a:ea typeface="Courier New" charset="0"/>
-              <a:cs typeface="Courier New" charset="0"/>
-            </a:endParaRPr>
-          </a:p>
-          <a:p>
-            <a:pPr marL="0" indent="0">
-              <a:spcBef>
-                <a:spcPts val="0"/>
-              </a:spcBef>
-              <a:buNone/>
-            </a:pPr>
-            <a:r>
-              <a:rPr lang="en-US" dirty="0" smtClean="0">
-                <a:solidFill>
-                  <a:schemeClr val="accent4">
-                    <a:lumMod val="75000"/>
-                  </a:schemeClr>
-                </a:solidFill>
-                <a:latin typeface="Courier New" charset="0"/>
-                <a:ea typeface="Courier New" charset="0"/>
-                <a:cs typeface="Courier New" charset="0"/>
-              </a:rPr>
-              <a:t>#</a:t>
-            </a:r>
-            <a:endParaRPr lang="en-US" dirty="0">
-              <a:solidFill>
-                <a:schemeClr val="accent4">
-                  <a:lumMod val="75000"/>
-                </a:schemeClr>
-              </a:solidFill>
-              <a:latin typeface="Courier New" charset="0"/>
-              <a:ea typeface="Courier New" charset="0"/>
-              <a:cs typeface="Courier New" charset="0"/>
-            </a:endParaRPr>
-          </a:p>
-          <a:p>
-            <a:pPr marL="0" indent="0">
-              <a:spcBef>
-                <a:spcPts val="0"/>
-              </a:spcBef>
-              <a:buNone/>
-            </a:pPr>
-            <a:r>
-              <a:rPr lang="en-US" dirty="0">
-                <a:solidFill>
-                  <a:schemeClr val="accent4">
-                    <a:lumMod val="75000"/>
-                  </a:schemeClr>
-                </a:solidFill>
-                <a:latin typeface="Courier New" charset="0"/>
-                <a:ea typeface="Courier New" charset="0"/>
-                <a:cs typeface="Courier New" charset="0"/>
-              </a:rPr>
-              <a:t># </a:t>
-            </a:r>
-            <a:r>
-              <a:rPr lang="en-US" dirty="0" smtClean="0">
-                <a:solidFill>
-                  <a:schemeClr val="accent4">
-                    <a:lumMod val="75000"/>
-                  </a:schemeClr>
-                </a:solidFill>
-                <a:latin typeface="Courier New" charset="0"/>
-                <a:ea typeface="Courier New" charset="0"/>
-                <a:cs typeface="Courier New" charset="0"/>
-              </a:rPr>
-              <a:t>This is a comment!</a:t>
-            </a:r>
-            <a:endParaRPr lang="en-US" dirty="0">
-              <a:solidFill>
-                <a:schemeClr val="accent4">
-                  <a:lumMod val="75000"/>
-                </a:schemeClr>
-              </a:solidFill>
-              <a:latin typeface="Courier New" charset="0"/>
-              <a:ea typeface="Courier New" charset="0"/>
-              <a:cs typeface="Courier New" charset="0"/>
-            </a:endParaRPr>
-          </a:p>
-          <a:p>
-            <a:pPr marL="0" indent="0">
-              <a:spcBef>
-                <a:spcPts val="0"/>
-              </a:spcBef>
-              <a:buNone/>
-            </a:pPr>
-            <a:r>
-              <a:rPr lang="en-US" dirty="0" smtClean="0">
-                <a:solidFill>
-                  <a:schemeClr val="accent4">
-                    <a:lumMod val="75000"/>
-                  </a:schemeClr>
-                </a:solidFill>
-                <a:latin typeface="Courier New" charset="0"/>
-                <a:ea typeface="Courier New" charset="0"/>
-                <a:cs typeface="Courier New" charset="0"/>
-              </a:rPr>
-              <a:t>#</a:t>
-            </a:r>
-            <a:r>
-              <a:rPr lang="en-US" dirty="0" smtClean="0"/>
-              <a:t/>
-            </a:r>
-            <a:br>
-              <a:rPr lang="en-US" dirty="0" smtClean="0"/>
-            </a:br>
-            <a:endParaRPr lang="en-US" dirty="0" smtClean="0"/>
-          </a:p>
-        </p:txBody>
-      </p:sp>
-    </p:spTree>
-    <p:extLst>
-      <p:ext uri="{BB962C8B-B14F-4D97-AF65-F5344CB8AC3E}">
-        <p14:creationId xmlns:p14="http://schemas.microsoft.com/office/powerpoint/2010/main" val="1965141648"/>
-      </p:ext>
-    </p:extLst>
-  </p:cSld>
-  <p:clrMapOvr>
-    <a:masterClrMapping/>
-  </p:clrMapOvr>
-  <p:timing>
-    <p:tnLst>
-      <p:par>
-        <p:cTn id="1" dur="indefinite" restart="never" nodeType="tmRoot"/>
-      </p:par>
-    </p:tnLst>
-  </p:timing>
-</p:sld>
-</file>
-
-<file path=ppt/slides/slide37.xml><?xml version="1.0" encoding="utf-8"?>
-<p:sld xmlns:a="http://schemas.openxmlformats.org/drawingml/2006/main" xmlns:r="http://schemas.openxmlformats.org/officeDocument/2006/relationships" xmlns:p="http://schemas.openxmlformats.org/presentationml/2006/main">
-  <p:cSld>
-    <p:spTree>
-      <p:nvGrpSpPr>
-        <p:cNvPr id="1" name=""/>
-        <p:cNvGrpSpPr/>
-        <p:nvPr/>
-      </p:nvGrpSpPr>
-      <p:grpSpPr>
-        <a:xfrm>
-          <a:off x="0" y="0"/>
-          <a:ext cx="0" cy="0"/>
-          <a:chOff x="0" y="0"/>
-          <a:chExt cx="0" cy="0"/>
-        </a:xfrm>
-      </p:grpSpPr>
-      <p:sp>
-        <p:nvSpPr>
-          <p:cNvPr id="4" name="Title 3"/>
-          <p:cNvSpPr>
-            <a:spLocks noGrp="1"/>
-          </p:cNvSpPr>
-          <p:nvPr>
-            <p:ph type="title"/>
-          </p:nvPr>
-        </p:nvSpPr>
-        <p:spPr>
-          <a:xfrm>
-            <a:off x="963084" y="1542098"/>
-            <a:ext cx="10363200" cy="1362075"/>
-          </a:xfrm>
-        </p:spPr>
-        <p:txBody>
-          <a:bodyPr/>
-          <a:lstStyle/>
-          <a:p>
-            <a:pPr algn="ctr"/>
-            <a:r>
-              <a:rPr lang="en-US" dirty="0" smtClean="0"/>
-              <a:t>LAB TIME </a:t>
-            </a:r>
-            <a:endParaRPr lang="en-US" dirty="0"/>
-          </a:p>
-        </p:txBody>
-      </p:sp>
-      <p:sp>
-        <p:nvSpPr>
-          <p:cNvPr id="2" name="Text Placeholder 1"/>
-          <p:cNvSpPr>
-            <a:spLocks noGrp="1"/>
-          </p:cNvSpPr>
-          <p:nvPr>
-            <p:ph type="body" idx="1"/>
-          </p:nvPr>
-        </p:nvSpPr>
-        <p:spPr>
-          <a:xfrm>
-            <a:off x="963084" y="2621281"/>
-            <a:ext cx="10363200" cy="3403600"/>
-          </a:xfrm>
-        </p:spPr>
-        <p:txBody>
-          <a:bodyPr>
-            <a:normAutofit/>
-          </a:bodyPr>
-          <a:lstStyle/>
-          <a:p>
-            <a:pPr marL="457200" indent="-457200">
-              <a:buFont typeface="Arial" charset="0"/>
-              <a:buChar char="•"/>
-            </a:pPr>
-            <a:r>
-              <a:rPr lang="en-US" dirty="0" smtClean="0">
-                <a:solidFill>
-                  <a:schemeClr val="tx1"/>
-                </a:solidFill>
-              </a:rPr>
-              <a:t>Use the remainder of class to explore the teleport code. Try different values and see where Steve goes!</a:t>
-            </a:r>
-            <a:endParaRPr lang="en-US" dirty="0">
-              <a:solidFill>
-                <a:schemeClr val="tx1"/>
-              </a:solidFill>
-            </a:endParaRPr>
-          </a:p>
-          <a:p>
-            <a:pPr marL="457200" indent="-457200">
-              <a:buFont typeface="Arial" charset="0"/>
-              <a:buChar char="•"/>
-            </a:pPr>
-            <a:r>
-              <a:rPr lang="en-US" dirty="0" smtClean="0">
-                <a:solidFill>
-                  <a:schemeClr val="tx1"/>
-                </a:solidFill>
-              </a:rPr>
-              <a:t>You can leave when you’re finished.</a:t>
-            </a:r>
-            <a:endParaRPr lang="en-US" dirty="0">
-              <a:solidFill>
-                <a:schemeClr val="tx1"/>
-              </a:solidFill>
-            </a:endParaRPr>
-          </a:p>
-          <a:p>
-            <a:pPr marL="457200" indent="-457200">
-              <a:buFont typeface="Arial" charset="0"/>
-              <a:buChar char="•"/>
-            </a:pPr>
-            <a:r>
-              <a:rPr lang="en-US" b="1" dirty="0" smtClean="0">
-                <a:solidFill>
-                  <a:schemeClr val="tx1"/>
-                </a:solidFill>
-              </a:rPr>
-              <a:t>DO NOT DISTURB </a:t>
-            </a:r>
-            <a:r>
-              <a:rPr lang="en-US" dirty="0" smtClean="0">
-                <a:solidFill>
-                  <a:schemeClr val="tx1"/>
-                </a:solidFill>
-              </a:rPr>
-              <a:t>the other classes!</a:t>
-            </a:r>
-            <a:endParaRPr lang="en-US" b="1" dirty="0">
-              <a:solidFill>
-                <a:schemeClr val="tx1"/>
-              </a:solidFill>
-            </a:endParaRPr>
-          </a:p>
-          <a:p>
-            <a:pPr marL="457200" indent="-457200">
-              <a:buFont typeface="Arial" charset="0"/>
-              <a:buChar char="•"/>
-            </a:pPr>
-            <a:endParaRPr lang="en-US" dirty="0" smtClean="0">
-              <a:solidFill>
-                <a:schemeClr val="tx1"/>
-              </a:solidFill>
-            </a:endParaRPr>
-          </a:p>
-          <a:p>
-            <a:pPr algn="ctr"/>
-            <a:r>
-              <a:rPr lang="en-US" b="1" dirty="0" smtClean="0">
-                <a:solidFill>
-                  <a:srgbClr val="FF0000"/>
-                </a:solidFill>
-              </a:rPr>
-              <a:t>REMEMBER TO SHUTDOWN YOUR RASPBERRY PI</a:t>
-            </a:r>
-          </a:p>
-          <a:p>
-            <a:pPr algn="ctr"/>
-            <a:r>
-              <a:rPr lang="en-US" b="1" dirty="0" smtClean="0">
-                <a:solidFill>
-                  <a:srgbClr val="FF0000"/>
-                </a:solidFill>
-              </a:rPr>
-              <a:t>DO NOT POWER IT OFF UNTIL YOU SHUTDOWN</a:t>
-            </a:r>
-            <a:endParaRPr lang="en-US" b="1" dirty="0">
-              <a:solidFill>
-                <a:srgbClr val="FF0000"/>
-              </a:solidFill>
-            </a:endParaRPr>
-          </a:p>
-        </p:txBody>
-      </p:sp>
-    </p:spTree>
-    <p:extLst>
-      <p:ext uri="{BB962C8B-B14F-4D97-AF65-F5344CB8AC3E}">
-        <p14:creationId xmlns:p14="http://schemas.microsoft.com/office/powerpoint/2010/main" val="2013213598"/>
-      </p:ext>
-    </p:extLst>
-  </p:cSld>
-  <p:clrMapOvr>
-    <a:masterClrMapping/>
-  </p:clrMapOvr>
-</p:sld>
-</file>
-
-<file path=ppt/slides/slide38.xml><?xml version="1.0" encoding="utf-8"?>
-<p:sld xmlns:a="http://schemas.openxmlformats.org/drawingml/2006/main" xmlns:r="http://schemas.openxmlformats.org/officeDocument/2006/relationships" xmlns:p="http://schemas.openxmlformats.org/presentationml/2006/main">
-  <p:cSld>
-    <p:spTree>
-      <p:nvGrpSpPr>
-        <p:cNvPr id="1" name=""/>
-        <p:cNvGrpSpPr/>
-        <p:nvPr/>
-      </p:nvGrpSpPr>
-      <p:grpSpPr>
-        <a:xfrm>
-          <a:off x="0" y="0"/>
-          <a:ext cx="0" cy="0"/>
-          <a:chOff x="0" y="0"/>
-          <a:chExt cx="0" cy="0"/>
-        </a:xfrm>
-      </p:grpSpPr>
-      <p:sp>
-        <p:nvSpPr>
-          <p:cNvPr id="4" name="Title 3"/>
-          <p:cNvSpPr>
-            <a:spLocks noGrp="1"/>
-          </p:cNvSpPr>
-          <p:nvPr>
-            <p:ph type="title"/>
-          </p:nvPr>
-        </p:nvSpPr>
-        <p:spPr>
-          <a:xfrm>
-            <a:off x="685800" y="2381693"/>
-            <a:ext cx="10820400" cy="1174306"/>
-          </a:xfrm>
-        </p:spPr>
-        <p:txBody>
-          <a:bodyPr/>
-          <a:lstStyle/>
-          <a:p>
-            <a:pPr algn="ctr"/>
-            <a:r>
-              <a:rPr lang="en-US" dirty="0" smtClean="0"/>
-              <a:t>Questions or comments?</a:t>
-            </a:r>
-            <a:endParaRPr lang="en-US" dirty="0"/>
-          </a:p>
-        </p:txBody>
-      </p:sp>
-    </p:spTree>
-    <p:extLst>
-      <p:ext uri="{BB962C8B-B14F-4D97-AF65-F5344CB8AC3E}">
-        <p14:creationId xmlns:p14="http://schemas.microsoft.com/office/powerpoint/2010/main" val="408753220"/>
       </p:ext>
     </p:extLst>
   </p:cSld>
@@ -11972,7 +8707,6 @@
               <a:rPr lang="en-US" dirty="0" smtClean="0"/>
               <a:t>Which is easier to refine?</a:t>
             </a:r>
-            <a:endParaRPr lang="en-US" dirty="0" smtClean="0"/>
           </a:p>
         </p:txBody>
       </p:sp>

</xml_diff>